<commit_message>
add formatting and conditional publishing
</commit_message>
<xml_diff>
--- a/docs/portfolio.pptx
+++ b/docs/portfolio.pptx
@@ -2,7 +2,7 @@
 <file path=ppt/presentation.xml><?xml version="1.0" encoding="utf-8"?>
 <p:presentation xmlns:a="http://schemas.openxmlformats.org/drawingml/2006/main" xmlns:p="http://schemas.openxmlformats.org/presentationml/2006/main" xmlns:r="http://schemas.openxmlformats.org/officeDocument/2006/relationships" autoCompressPictures="0" saveSubsetFonts="1">
   <p:sldMasterIdLst>
-    <p:sldMasterId id="2147483648" r:id="rId1"/>
+    <p:sldMasterId id="2147483660" r:id="rId1"/>
   </p:sldMasterIdLst>
   <p:sldIdLst>
     <p:sldId id="256" r:id="rId2"/>
@@ -125,8 +125,18 @@
 </file>
 
 <file path=ppt/slideLayouts/slideLayout1.xml><?xml version="1.0" encoding="utf-8"?>
-<p:sldLayout xmlns:a="http://schemas.openxmlformats.org/drawingml/2006/main" xmlns:r="http://schemas.openxmlformats.org/officeDocument/2006/relationships" xmlns:p="http://schemas.openxmlformats.org/presentationml/2006/main" type="title" preserve="1">
+<p:sldLayout xmlns:a="http://schemas.openxmlformats.org/drawingml/2006/main" xmlns:r="http://schemas.openxmlformats.org/officeDocument/2006/relationships" xmlns:p="http://schemas.openxmlformats.org/presentationml/2006/main" showMasterSp="0" type="title" preserve="1">
   <p:cSld name="Title Slide">
+    <p:bg>
+      <p:bgPr>
+        <a:solidFill>
+          <a:schemeClr val="bg2">
+            <a:lumMod val="75000"/>
+          </a:schemeClr>
+        </a:solidFill>
+        <a:effectLst/>
+      </p:bgPr>
+    </p:bg>
     <p:spTree>
       <p:nvGrpSpPr>
         <p:cNvPr id="1" name=""/>
@@ -153,18 +163,32 @@
         </p:nvSpPr>
         <p:spPr>
           <a:xfrm>
-            <a:off x="685800" y="1597819"/>
-            <a:ext cx="7772400" cy="1102519"/>
+            <a:off x="946404" y="569214"/>
+            <a:ext cx="7063740" cy="3031236"/>
           </a:xfrm>
         </p:spPr>
         <p:txBody>
-          <a:bodyPr/>
-          <a:lstStyle/>
+          <a:bodyPr anchor="b">
+            <a:normAutofit/>
+          </a:bodyPr>
+          <a:lstStyle>
+            <a:lvl1pPr algn="l">
+              <a:lnSpc>
+                <a:spcPct val="85000"/>
+              </a:lnSpc>
+              <a:defRPr sz="5400" baseline="0">
+                <a:solidFill>
+                  <a:schemeClr val="tx1"/>
+                </a:solidFill>
+              </a:defRPr>
+            </a:lvl1pPr>
+          </a:lstStyle>
           <a:p>
             <a:r>
               <a:rPr lang="en-US"/>
               <a:t>Click to edit Master title style</a:t>
             </a:r>
+            <a:endParaRPr lang="en-US" dirty="0"/>
           </a:p>
         </p:txBody>
       </p:sp>
@@ -180,168 +204,153 @@
         </p:nvSpPr>
         <p:spPr>
           <a:xfrm>
-            <a:off x="1371600" y="2914650"/>
-            <a:ext cx="6400800" cy="1314450"/>
+            <a:off x="946404" y="3600450"/>
+            <a:ext cx="7063740" cy="1268730"/>
           </a:xfrm>
         </p:spPr>
         <p:txBody>
-          <a:bodyPr/>
+          <a:bodyPr>
+            <a:normAutofit/>
+          </a:bodyPr>
           <a:lstStyle>
-            <a:lvl1pPr marL="0" indent="0" algn="ctr">
-              <a:buNone/>
-              <a:defRPr>
+            <a:lvl1pPr marL="0" indent="0" algn="l">
+              <a:buNone/>
+              <a:defRPr sz="1650" baseline="0">
                 <a:solidFill>
                   <a:schemeClr val="tx1">
-                    <a:tint val="75000"/>
+                    <a:lumMod val="75000"/>
                   </a:schemeClr>
                 </a:solidFill>
               </a:defRPr>
             </a:lvl1pPr>
             <a:lvl2pPr marL="342900" indent="0" algn="ctr">
               <a:buNone/>
+              <a:defRPr sz="1650"/>
+            </a:lvl2pPr>
+            <a:lvl3pPr marL="685800" indent="0" algn="ctr">
+              <a:buNone/>
+              <a:defRPr sz="1650"/>
+            </a:lvl3pPr>
+            <a:lvl4pPr marL="1028700" indent="0" algn="ctr">
+              <a:buNone/>
+              <a:defRPr sz="1500"/>
+            </a:lvl4pPr>
+            <a:lvl5pPr marL="1371600" indent="0" algn="ctr">
+              <a:buNone/>
+              <a:defRPr sz="1500"/>
+            </a:lvl5pPr>
+            <a:lvl6pPr marL="1714500" indent="0" algn="ctr">
+              <a:buNone/>
+              <a:defRPr sz="1500"/>
+            </a:lvl6pPr>
+            <a:lvl7pPr marL="2057400" indent="0" algn="ctr">
+              <a:buNone/>
+              <a:defRPr sz="1500"/>
+            </a:lvl7pPr>
+            <a:lvl8pPr marL="2400300" indent="0" algn="ctr">
+              <a:buNone/>
+              <a:defRPr sz="1500"/>
+            </a:lvl8pPr>
+            <a:lvl9pPr marL="2743200" indent="0" algn="ctr">
+              <a:buNone/>
+              <a:defRPr sz="1500"/>
+            </a:lvl9pPr>
+          </a:lstStyle>
+          <a:p>
+            <a:r>
+              <a:rPr lang="en-US"/>
+              <a:t>Click to edit Master subtitle style</a:t>
+            </a:r>
+            <a:endParaRPr lang="en-US" dirty="0"/>
+          </a:p>
+        </p:txBody>
+      </p:sp>
+      <p:sp>
+        <p:nvSpPr>
+          <p:cNvPr id="4" name="Date Placeholder 3"/>
+          <p:cNvSpPr>
+            <a:spLocks noGrp="1"/>
+          </p:cNvSpPr>
+          <p:nvPr>
+            <p:ph type="dt" sz="half" idx="10"/>
+          </p:nvPr>
+        </p:nvSpPr>
+        <p:spPr/>
+        <p:txBody>
+          <a:bodyPr/>
+          <a:lstStyle>
+            <a:lvl1pPr>
               <a:defRPr>
                 <a:solidFill>
                   <a:schemeClr val="tx1">
-                    <a:tint val="75000"/>
+                    <a:lumMod val="50000"/>
                   </a:schemeClr>
                 </a:solidFill>
               </a:defRPr>
-            </a:lvl2pPr>
-            <a:lvl3pPr marL="685800" indent="0" algn="ctr">
-              <a:buNone/>
+            </a:lvl1pPr>
+          </a:lstStyle>
+          <a:p>
+            <a:fld id="{241EB5C9-1307-BA42-ABA2-0BC069CD8E7F}" type="datetimeFigureOut">
+              <a:rPr lang="en-US" smtClean="0"/>
+              <a:t>10/6/2023</a:t>
+            </a:fld>
+            <a:endParaRPr lang="en-US"/>
+          </a:p>
+        </p:txBody>
+      </p:sp>
+      <p:sp>
+        <p:nvSpPr>
+          <p:cNvPr id="5" name="Footer Placeholder 4"/>
+          <p:cNvSpPr>
+            <a:spLocks noGrp="1"/>
+          </p:cNvSpPr>
+          <p:nvPr>
+            <p:ph type="ftr" sz="quarter" idx="11"/>
+          </p:nvPr>
+        </p:nvSpPr>
+        <p:spPr/>
+        <p:txBody>
+          <a:bodyPr/>
+          <a:lstStyle>
+            <a:lvl1pPr>
               <a:defRPr>
                 <a:solidFill>
                   <a:schemeClr val="tx1">
-                    <a:tint val="75000"/>
+                    <a:lumMod val="65000"/>
                   </a:schemeClr>
                 </a:solidFill>
               </a:defRPr>
-            </a:lvl3pPr>
-            <a:lvl4pPr marL="1028700" indent="0" algn="ctr">
-              <a:buNone/>
+            </a:lvl1pPr>
+          </a:lstStyle>
+          <a:p>
+            <a:endParaRPr lang="en-US"/>
+          </a:p>
+        </p:txBody>
+      </p:sp>
+      <p:sp>
+        <p:nvSpPr>
+          <p:cNvPr id="6" name="Slide Number Placeholder 5"/>
+          <p:cNvSpPr>
+            <a:spLocks noGrp="1"/>
+          </p:cNvSpPr>
+          <p:nvPr>
+            <p:ph type="sldNum" sz="quarter" idx="12"/>
+          </p:nvPr>
+        </p:nvSpPr>
+        <p:spPr/>
+        <p:txBody>
+          <a:bodyPr/>
+          <a:lstStyle>
+            <a:lvl1pPr>
               <a:defRPr>
                 <a:solidFill>
                   <a:schemeClr val="tx1">
-                    <a:tint val="75000"/>
+                    <a:lumMod val="65000"/>
                   </a:schemeClr>
                 </a:solidFill>
               </a:defRPr>
-            </a:lvl4pPr>
-            <a:lvl5pPr marL="1371600" indent="0" algn="ctr">
-              <a:buNone/>
-              <a:defRPr>
-                <a:solidFill>
-                  <a:schemeClr val="tx1">
-                    <a:tint val="75000"/>
-                  </a:schemeClr>
-                </a:solidFill>
-              </a:defRPr>
-            </a:lvl5pPr>
-            <a:lvl6pPr marL="1714500" indent="0" algn="ctr">
-              <a:buNone/>
-              <a:defRPr>
-                <a:solidFill>
-                  <a:schemeClr val="tx1">
-                    <a:tint val="75000"/>
-                  </a:schemeClr>
-                </a:solidFill>
-              </a:defRPr>
-            </a:lvl6pPr>
-            <a:lvl7pPr marL="2057400" indent="0" algn="ctr">
-              <a:buNone/>
-              <a:defRPr>
-                <a:solidFill>
-                  <a:schemeClr val="tx1">
-                    <a:tint val="75000"/>
-                  </a:schemeClr>
-                </a:solidFill>
-              </a:defRPr>
-            </a:lvl7pPr>
-            <a:lvl8pPr marL="2400300" indent="0" algn="ctr">
-              <a:buNone/>
-              <a:defRPr>
-                <a:solidFill>
-                  <a:schemeClr val="tx1">
-                    <a:tint val="75000"/>
-                  </a:schemeClr>
-                </a:solidFill>
-              </a:defRPr>
-            </a:lvl8pPr>
-            <a:lvl9pPr marL="2743200" indent="0" algn="ctr">
-              <a:buNone/>
-              <a:defRPr>
-                <a:solidFill>
-                  <a:schemeClr val="tx1">
-                    <a:tint val="75000"/>
-                  </a:schemeClr>
-                </a:solidFill>
-              </a:defRPr>
-            </a:lvl9pPr>
+            </a:lvl1pPr>
           </a:lstStyle>
-          <a:p>
-            <a:r>
-              <a:rPr lang="en-US"/>
-              <a:t>Click to edit Master subtitle style</a:t>
-            </a:r>
-          </a:p>
-        </p:txBody>
-      </p:sp>
-      <p:sp>
-        <p:nvSpPr>
-          <p:cNvPr id="4" name="Date Placeholder 3"/>
-          <p:cNvSpPr>
-            <a:spLocks noGrp="1"/>
-          </p:cNvSpPr>
-          <p:nvPr>
-            <p:ph type="dt" sz="half" idx="10"/>
-          </p:nvPr>
-        </p:nvSpPr>
-        <p:spPr/>
-        <p:txBody>
-          <a:bodyPr/>
-          <a:lstStyle/>
-          <a:p>
-            <a:fld id="{241EB5C9-1307-BA42-ABA2-0BC069CD8E7F}" type="datetimeFigureOut">
-              <a:rPr lang="en-US" smtClean="0"/>
-              <a:t>1/2/22</a:t>
-            </a:fld>
-            <a:endParaRPr lang="en-US"/>
-          </a:p>
-        </p:txBody>
-      </p:sp>
-      <p:sp>
-        <p:nvSpPr>
-          <p:cNvPr id="5" name="Footer Placeholder 4"/>
-          <p:cNvSpPr>
-            <a:spLocks noGrp="1"/>
-          </p:cNvSpPr>
-          <p:nvPr>
-            <p:ph type="ftr" sz="quarter" idx="11"/>
-          </p:nvPr>
-        </p:nvSpPr>
-        <p:spPr/>
-        <p:txBody>
-          <a:bodyPr/>
-          <a:lstStyle/>
-          <a:p>
-            <a:endParaRPr lang="en-US"/>
-          </a:p>
-        </p:txBody>
-      </p:sp>
-      <p:sp>
-        <p:nvSpPr>
-          <p:cNvPr id="6" name="Slide Number Placeholder 5"/>
-          <p:cNvSpPr>
-            <a:spLocks noGrp="1"/>
-          </p:cNvSpPr>
-          <p:nvPr>
-            <p:ph type="sldNum" sz="quarter" idx="12"/>
-          </p:nvPr>
-        </p:nvSpPr>
-        <p:spPr/>
-        <p:txBody>
-          <a:bodyPr/>
-          <a:lstStyle/>
           <a:p>
             <a:fld id="{C5EF2332-01BF-834F-8236-50238282D533}" type="slidenum">
               <a:rPr lang="en-US" smtClean="0"/>
@@ -351,15 +360,53 @@
           </a:p>
         </p:txBody>
       </p:sp>
+      <p:sp>
+        <p:nvSpPr>
+          <p:cNvPr id="7" name="Rectangle 6"/>
+          <p:cNvSpPr/>
+          <p:nvPr/>
+        </p:nvSpPr>
+        <p:spPr>
+          <a:xfrm>
+            <a:off x="0" y="0"/>
+            <a:ext cx="342900" cy="5143500"/>
+          </a:xfrm>
+          <a:prstGeom prst="rect">
+            <a:avLst/>
+          </a:prstGeom>
+          <a:solidFill>
+            <a:schemeClr val="accent1"/>
+          </a:solidFill>
+          <a:ln>
+            <a:noFill/>
+          </a:ln>
+        </p:spPr>
+        <p:style>
+          <a:lnRef idx="2">
+            <a:schemeClr val="accent1">
+              <a:shade val="50000"/>
+            </a:schemeClr>
+          </a:lnRef>
+          <a:fillRef idx="1">
+            <a:schemeClr val="accent1"/>
+          </a:fillRef>
+          <a:effectRef idx="0">
+            <a:schemeClr val="accent1"/>
+          </a:effectRef>
+          <a:fontRef idx="minor">
+            <a:schemeClr val="lt1"/>
+          </a:fontRef>
+        </p:style>
+      </p:sp>
     </p:spTree>
     <p:extLst>
       <p:ext uri="{BB962C8B-B14F-4D97-AF65-F5344CB8AC3E}">
-        <p14:creationId xmlns:p14="http://schemas.microsoft.com/office/powerpoint/2010/main" val="1444357513"/>
+        <p14:creationId xmlns:p14="http://schemas.microsoft.com/office/powerpoint/2010/main" val="1645105177"/>
       </p:ext>
     </p:extLst>
   </p:cSld>
   <p:clrMapOvr>
-    <a:masterClrMapping/>
+    <a:overrideClrMapping bg1="dk1" tx1="lt1" bg2="dk2" tx2="lt2" accent1="accent1" accent2="accent2" accent3="accent3" accent4="accent4" accent5="accent5" accent6="accent6" hlink="hlink" folHlink="folHlink"/>
   </p:clrMapOvr>
 </p:sldLayout>
 </file>
@@ -400,6 +447,7 @@
               <a:rPr lang="en-US"/>
               <a:t>Click to edit Master title style</a:t>
             </a:r>
+            <a:endParaRPr lang="en-US" dirty="0"/>
           </a:p>
         </p:txBody>
       </p:sp>
@@ -451,6 +499,7 @@
               <a:rPr lang="en-US"/>
               <a:t>Fifth level</a:t>
             </a:r>
+            <a:endParaRPr lang="en-US" dirty="0"/>
           </a:p>
         </p:txBody>
       </p:sp>
@@ -471,7 +520,7 @@
           <a:p>
             <a:fld id="{241EB5C9-1307-BA42-ABA2-0BC069CD8E7F}" type="datetimeFigureOut">
               <a:rPr lang="en-US" smtClean="0"/>
-              <a:t>1/2/22</a:t>
+              <a:t>10/6/2023</a:t>
             </a:fld>
             <a:endParaRPr lang="en-US"/>
           </a:p>
@@ -522,7 +571,7 @@
     </p:spTree>
     <p:extLst>
       <p:ext uri="{BB962C8B-B14F-4D97-AF65-F5344CB8AC3E}">
-        <p14:creationId xmlns:p14="http://schemas.microsoft.com/office/powerpoint/2010/main" val="313914798"/>
+        <p14:creationId xmlns:p14="http://schemas.microsoft.com/office/powerpoint/2010/main" val="3798446713"/>
       </p:ext>
     </p:extLst>
   </p:cSld>
@@ -561,8 +610,8 @@
         </p:nvSpPr>
         <p:spPr>
           <a:xfrm>
-            <a:off x="6629400" y="205979"/>
-            <a:ext cx="2057400" cy="4388644"/>
+            <a:off x="6486525" y="285750"/>
+            <a:ext cx="1857375" cy="4423172"/>
           </a:xfrm>
         </p:spPr>
         <p:txBody>
@@ -573,6 +622,7 @@
               <a:rPr lang="en-US"/>
               <a:t>Click to edit Master title style</a:t>
             </a:r>
+            <a:endParaRPr lang="en-US" dirty="0"/>
           </a:p>
         </p:txBody>
       </p:sp>
@@ -588,8 +638,8 @@
         </p:nvSpPr>
         <p:spPr>
           <a:xfrm>
-            <a:off x="457200" y="205979"/>
-            <a:ext cx="6019800" cy="4388644"/>
+            <a:off x="571500" y="285750"/>
+            <a:ext cx="5800725" cy="4423172"/>
           </a:xfrm>
         </p:spPr>
         <p:txBody>
@@ -629,6 +679,7 @@
               <a:rPr lang="en-US"/>
               <a:t>Fifth level</a:t>
             </a:r>
+            <a:endParaRPr lang="en-US" dirty="0"/>
           </a:p>
         </p:txBody>
       </p:sp>
@@ -649,7 +700,7 @@
           <a:p>
             <a:fld id="{241EB5C9-1307-BA42-ABA2-0BC069CD8E7F}" type="datetimeFigureOut">
               <a:rPr lang="en-US" smtClean="0"/>
-              <a:t>1/2/22</a:t>
+              <a:t>10/6/2023</a:t>
             </a:fld>
             <a:endParaRPr lang="en-US"/>
           </a:p>
@@ -700,7 +751,7 @@
     </p:spTree>
     <p:extLst>
       <p:ext uri="{BB962C8B-B14F-4D97-AF65-F5344CB8AC3E}">
-        <p14:creationId xmlns:p14="http://schemas.microsoft.com/office/powerpoint/2010/main" val="2581529045"/>
+        <p14:creationId xmlns:p14="http://schemas.microsoft.com/office/powerpoint/2010/main" val="2863515127"/>
       </p:ext>
     </p:extLst>
   </p:cSld>
@@ -746,6 +797,7 @@
               <a:rPr lang="en-US"/>
               <a:t>Click to edit Master title style</a:t>
             </a:r>
+            <a:endParaRPr lang="en-US" dirty="0"/>
           </a:p>
         </p:txBody>
       </p:sp>
@@ -797,6 +849,7 @@
               <a:rPr lang="en-US"/>
               <a:t>Fifth level</a:t>
             </a:r>
+            <a:endParaRPr lang="en-US" dirty="0"/>
           </a:p>
         </p:txBody>
       </p:sp>
@@ -817,7 +870,7 @@
           <a:p>
             <a:fld id="{241EB5C9-1307-BA42-ABA2-0BC069CD8E7F}" type="datetimeFigureOut">
               <a:rPr lang="en-US" smtClean="0"/>
-              <a:t>1/2/22</a:t>
+              <a:t>10/6/2023</a:t>
             </a:fld>
             <a:endParaRPr lang="en-US"/>
           </a:p>
@@ -868,7 +921,7 @@
     </p:spTree>
     <p:extLst>
       <p:ext uri="{BB962C8B-B14F-4D97-AF65-F5344CB8AC3E}">
-        <p14:creationId xmlns:p14="http://schemas.microsoft.com/office/powerpoint/2010/main" val="338346009"/>
+        <p14:creationId xmlns:p14="http://schemas.microsoft.com/office/powerpoint/2010/main" val="526191605"/>
       </p:ext>
     </p:extLst>
   </p:cSld>
@@ -907,15 +960,20 @@
         </p:nvSpPr>
         <p:spPr>
           <a:xfrm>
-            <a:off x="722313" y="3305176"/>
-            <a:ext cx="7772400" cy="1021556"/>
+            <a:off x="946404" y="569214"/>
+            <a:ext cx="7063740" cy="3031236"/>
           </a:xfrm>
         </p:spPr>
         <p:txBody>
-          <a:bodyPr anchor="t"/>
+          <a:bodyPr anchor="b">
+            <a:normAutofit/>
+          </a:bodyPr>
           <a:lstStyle>
-            <a:lvl1pPr algn="l">
-              <a:defRPr sz="3000" b="1" cap="all"/>
+            <a:lvl1pPr>
+              <a:lnSpc>
+                <a:spcPct val="85000"/>
+              </a:lnSpc>
+              <a:defRPr sz="5400" b="0"/>
             </a:lvl1pPr>
           </a:lstStyle>
           <a:p>
@@ -923,6 +981,7 @@
               <a:rPr lang="en-US"/>
               <a:t>Click to edit Master title style</a:t>
             </a:r>
+            <a:endParaRPr lang="en-US" dirty="0"/>
           </a:p>
         </p:txBody>
       </p:sp>
@@ -938,19 +997,22 @@
         </p:nvSpPr>
         <p:spPr>
           <a:xfrm>
-            <a:off x="722313" y="2180035"/>
-            <a:ext cx="7772400" cy="1125140"/>
+            <a:off x="946404" y="3600450"/>
+            <a:ext cx="7063740" cy="1268730"/>
           </a:xfrm>
         </p:spPr>
         <p:txBody>
-          <a:bodyPr anchor="b"/>
+          <a:bodyPr anchor="t">
+            <a:normAutofit/>
+          </a:bodyPr>
           <a:lstStyle>
             <a:lvl1pPr marL="0" indent="0">
               <a:buNone/>
-              <a:defRPr sz="1500">
+              <a:defRPr sz="1650">
                 <a:solidFill>
                   <a:schemeClr val="tx1">
-                    <a:tint val="75000"/>
+                    <a:lumMod val="65000"/>
+                    <a:lumOff val="35000"/>
                   </a:schemeClr>
                 </a:solidFill>
               </a:defRPr>
@@ -1062,7 +1124,7 @@
           <a:p>
             <a:fld id="{241EB5C9-1307-BA42-ABA2-0BC069CD8E7F}" type="datetimeFigureOut">
               <a:rPr lang="en-US" smtClean="0"/>
-              <a:t>1/2/22</a:t>
+              <a:t>10/6/2023</a:t>
             </a:fld>
             <a:endParaRPr lang="en-US"/>
           </a:p>
@@ -1110,10 +1172,48 @@
           </a:p>
         </p:txBody>
       </p:sp>
+      <p:sp>
+        <p:nvSpPr>
+          <p:cNvPr id="7" name="Rectangle 6"/>
+          <p:cNvSpPr/>
+          <p:nvPr/>
+        </p:nvSpPr>
+        <p:spPr>
+          <a:xfrm>
+            <a:off x="0" y="0"/>
+            <a:ext cx="342900" cy="5143500"/>
+          </a:xfrm>
+          <a:prstGeom prst="rect">
+            <a:avLst/>
+          </a:prstGeom>
+          <a:solidFill>
+            <a:schemeClr val="accent1"/>
+          </a:solidFill>
+          <a:ln>
+            <a:noFill/>
+          </a:ln>
+        </p:spPr>
+        <p:style>
+          <a:lnRef idx="2">
+            <a:schemeClr val="accent1">
+              <a:shade val="50000"/>
+            </a:schemeClr>
+          </a:lnRef>
+          <a:fillRef idx="1">
+            <a:schemeClr val="accent1"/>
+          </a:fillRef>
+          <a:effectRef idx="0">
+            <a:schemeClr val="accent1"/>
+          </a:effectRef>
+          <a:fontRef idx="minor">
+            <a:schemeClr val="lt1"/>
+          </a:fontRef>
+        </p:style>
+      </p:sp>
     </p:spTree>
     <p:extLst>
       <p:ext uri="{BB962C8B-B14F-4D97-AF65-F5344CB8AC3E}">
-        <p14:creationId xmlns:p14="http://schemas.microsoft.com/office/powerpoint/2010/main" val="1073069076"/>
+        <p14:creationId xmlns:p14="http://schemas.microsoft.com/office/powerpoint/2010/main" val="2403773796"/>
       </p:ext>
     </p:extLst>
   </p:cSld>
@@ -1159,6 +1259,7 @@
               <a:rPr lang="en-US"/>
               <a:t>Click to edit Master title style</a:t>
             </a:r>
+            <a:endParaRPr lang="en-US" dirty="0"/>
           </a:p>
         </p:txBody>
       </p:sp>
@@ -1174,39 +1275,39 @@
         </p:nvSpPr>
         <p:spPr>
           <a:xfrm>
-            <a:off x="457200" y="1200151"/>
-            <a:ext cx="4038600" cy="3394472"/>
+            <a:off x="946404" y="1371600"/>
+            <a:ext cx="3360420" cy="3263503"/>
           </a:xfrm>
         </p:spPr>
         <p:txBody>
           <a:bodyPr/>
           <a:lstStyle>
             <a:lvl1pPr>
-              <a:defRPr sz="2100"/>
+              <a:defRPr sz="1350"/>
             </a:lvl1pPr>
             <a:lvl2pPr>
-              <a:defRPr sz="1800"/>
+              <a:defRPr sz="1200"/>
             </a:lvl2pPr>
             <a:lvl3pPr>
-              <a:defRPr sz="1500"/>
+              <a:defRPr sz="1050"/>
             </a:lvl3pPr>
             <a:lvl4pPr>
-              <a:defRPr sz="1350"/>
+              <a:defRPr sz="1050"/>
             </a:lvl4pPr>
             <a:lvl5pPr>
-              <a:defRPr sz="1350"/>
+              <a:defRPr sz="1050"/>
             </a:lvl5pPr>
             <a:lvl6pPr>
-              <a:defRPr sz="1350"/>
+              <a:defRPr sz="1050"/>
             </a:lvl6pPr>
             <a:lvl7pPr>
-              <a:defRPr sz="1350"/>
+              <a:defRPr sz="1050"/>
             </a:lvl7pPr>
             <a:lvl8pPr>
-              <a:defRPr sz="1350"/>
+              <a:defRPr sz="1050"/>
             </a:lvl8pPr>
             <a:lvl9pPr>
-              <a:defRPr sz="1350"/>
+              <a:defRPr sz="1050"/>
             </a:lvl9pPr>
           </a:lstStyle>
           <a:p>
@@ -1243,6 +1344,7 @@
               <a:rPr lang="en-US"/>
               <a:t>Fifth level</a:t>
             </a:r>
+            <a:endParaRPr lang="en-US" dirty="0"/>
           </a:p>
         </p:txBody>
       </p:sp>
@@ -1258,39 +1360,39 @@
         </p:nvSpPr>
         <p:spPr>
           <a:xfrm>
-            <a:off x="4648200" y="1200151"/>
-            <a:ext cx="4038600" cy="3394472"/>
+            <a:off x="4594860" y="1371600"/>
+            <a:ext cx="3360420" cy="3263503"/>
           </a:xfrm>
         </p:spPr>
         <p:txBody>
           <a:bodyPr/>
           <a:lstStyle>
             <a:lvl1pPr>
-              <a:defRPr sz="2100"/>
+              <a:defRPr sz="1350"/>
             </a:lvl1pPr>
             <a:lvl2pPr>
-              <a:defRPr sz="1800"/>
+              <a:defRPr sz="1200"/>
             </a:lvl2pPr>
             <a:lvl3pPr>
-              <a:defRPr sz="1500"/>
+              <a:defRPr sz="1050"/>
             </a:lvl3pPr>
             <a:lvl4pPr>
-              <a:defRPr sz="1350"/>
+              <a:defRPr sz="1050"/>
             </a:lvl4pPr>
             <a:lvl5pPr>
-              <a:defRPr sz="1350"/>
+              <a:defRPr sz="1050"/>
             </a:lvl5pPr>
             <a:lvl6pPr>
-              <a:defRPr sz="1350"/>
+              <a:defRPr sz="1050"/>
             </a:lvl6pPr>
             <a:lvl7pPr>
-              <a:defRPr sz="1350"/>
+              <a:defRPr sz="1050"/>
             </a:lvl7pPr>
             <a:lvl8pPr>
-              <a:defRPr sz="1350"/>
+              <a:defRPr sz="1050"/>
             </a:lvl8pPr>
             <a:lvl9pPr>
-              <a:defRPr sz="1350"/>
+              <a:defRPr sz="1050"/>
             </a:lvl9pPr>
           </a:lstStyle>
           <a:p>
@@ -1327,6 +1429,7 @@
               <a:rPr lang="en-US"/>
               <a:t>Fifth level</a:t>
             </a:r>
+            <a:endParaRPr lang="en-US" dirty="0"/>
           </a:p>
         </p:txBody>
       </p:sp>
@@ -1347,7 +1450,7 @@
           <a:p>
             <a:fld id="{241EB5C9-1307-BA42-ABA2-0BC069CD8E7F}" type="datetimeFigureOut">
               <a:rPr lang="en-US" smtClean="0"/>
-              <a:t>1/2/22</a:t>
+              <a:t>10/6/2023</a:t>
             </a:fld>
             <a:endParaRPr lang="en-US"/>
           </a:p>
@@ -1398,7 +1501,7 @@
     </p:spTree>
     <p:extLst>
       <p:ext uri="{BB962C8B-B14F-4D97-AF65-F5344CB8AC3E}">
-        <p14:creationId xmlns:p14="http://schemas.microsoft.com/office/powerpoint/2010/main" val="2619886245"/>
+        <p14:creationId xmlns:p14="http://schemas.microsoft.com/office/powerpoint/2010/main" val="165353787"/>
       </p:ext>
     </p:extLst>
   </p:cSld>
@@ -1427,7 +1530,7 @@
       </p:grpSpPr>
       <p:sp>
         <p:nvSpPr>
-          <p:cNvPr id="2" name="Title 1"/>
+          <p:cNvPr id="10" name="Title 9"/>
           <p:cNvSpPr>
             <a:spLocks noGrp="1"/>
           </p:cNvSpPr>
@@ -1438,16 +1541,13 @@
         <p:spPr/>
         <p:txBody>
           <a:bodyPr/>
-          <a:lstStyle>
-            <a:lvl1pPr>
-              <a:defRPr/>
-            </a:lvl1pPr>
-          </a:lstStyle>
+          <a:lstStyle/>
           <a:p>
             <a:r>
               <a:rPr lang="en-US"/>
               <a:t>Click to edit Master title style</a:t>
             </a:r>
+            <a:endParaRPr lang="en-US" dirty="0"/>
           </a:p>
         </p:txBody>
       </p:sp>
@@ -1463,16 +1563,25 @@
         </p:nvSpPr>
         <p:spPr>
           <a:xfrm>
-            <a:off x="457200" y="1151335"/>
-            <a:ext cx="4040188" cy="479822"/>
+            <a:off x="946404" y="1285241"/>
+            <a:ext cx="3360420" cy="548640"/>
           </a:xfrm>
         </p:spPr>
         <p:txBody>
-          <a:bodyPr anchor="b"/>
+          <a:bodyPr anchor="b">
+            <a:normAutofit/>
+          </a:bodyPr>
           <a:lstStyle>
             <a:lvl1pPr marL="0" indent="0">
-              <a:buNone/>
-              <a:defRPr sz="1800" b="1"/>
+              <a:spcBef>
+                <a:spcPts val="0"/>
+              </a:spcBef>
+              <a:buNone/>
+              <a:defRPr sz="1500" b="0">
+                <a:solidFill>
+                  <a:schemeClr val="tx2"/>
+                </a:solidFill>
+              </a:defRPr>
             </a:lvl1pPr>
             <a:lvl2pPr marL="342900" indent="0">
               <a:buNone/>
@@ -1528,39 +1637,39 @@
         </p:nvSpPr>
         <p:spPr>
           <a:xfrm>
-            <a:off x="457200" y="1631156"/>
-            <a:ext cx="4040188" cy="2963466"/>
+            <a:off x="946404" y="1880662"/>
+            <a:ext cx="3360420" cy="2748488"/>
           </a:xfrm>
         </p:spPr>
         <p:txBody>
           <a:bodyPr/>
           <a:lstStyle>
             <a:lvl1pPr>
-              <a:defRPr sz="1800"/>
+              <a:defRPr sz="1350"/>
             </a:lvl1pPr>
             <a:lvl2pPr>
-              <a:defRPr sz="1500"/>
+              <a:defRPr sz="1200"/>
             </a:lvl2pPr>
             <a:lvl3pPr>
-              <a:defRPr sz="1350"/>
+              <a:defRPr sz="1050"/>
             </a:lvl3pPr>
             <a:lvl4pPr>
-              <a:defRPr sz="1200"/>
+              <a:defRPr sz="1050"/>
             </a:lvl4pPr>
             <a:lvl5pPr>
-              <a:defRPr sz="1200"/>
+              <a:defRPr sz="1050"/>
             </a:lvl5pPr>
             <a:lvl6pPr>
-              <a:defRPr sz="1200"/>
+              <a:defRPr sz="1050"/>
             </a:lvl6pPr>
             <a:lvl7pPr>
-              <a:defRPr sz="1200"/>
+              <a:defRPr sz="1050"/>
             </a:lvl7pPr>
             <a:lvl8pPr>
-              <a:defRPr sz="1200"/>
+              <a:defRPr sz="1050"/>
             </a:lvl8pPr>
             <a:lvl9pPr>
-              <a:defRPr sz="1200"/>
+              <a:defRPr sz="1050"/>
             </a:lvl9pPr>
           </a:lstStyle>
           <a:p>
@@ -1597,6 +1706,7 @@
               <a:rPr lang="en-US"/>
               <a:t>Fifth level</a:t>
             </a:r>
+            <a:endParaRPr lang="en-US" dirty="0"/>
           </a:p>
         </p:txBody>
       </p:sp>
@@ -1612,16 +1722,31 @@
         </p:nvSpPr>
         <p:spPr>
           <a:xfrm>
-            <a:off x="4645026" y="1151335"/>
-            <a:ext cx="4041775" cy="479822"/>
+            <a:off x="4594860" y="1285241"/>
+            <a:ext cx="3360420" cy="548640"/>
           </a:xfrm>
         </p:spPr>
         <p:txBody>
-          <a:bodyPr anchor="b"/>
+          <a:bodyPr anchor="b">
+            <a:normAutofit/>
+          </a:bodyPr>
           <a:lstStyle>
             <a:lvl1pPr marL="0" indent="0">
-              <a:buNone/>
-              <a:defRPr sz="1800" b="1"/>
+              <a:lnSpc>
+                <a:spcPct val="95000"/>
+              </a:lnSpc>
+              <a:spcBef>
+                <a:spcPts val="0"/>
+              </a:spcBef>
+              <a:buNone/>
+              <a:defRPr lang="en-US" sz="1500" b="0" kern="1200" dirty="0">
+                <a:solidFill>
+                  <a:schemeClr val="tx2"/>
+                </a:solidFill>
+                <a:latin typeface="+mn-lt"/>
+                <a:ea typeface="+mn-ea"/>
+                <a:cs typeface="+mn-cs"/>
+              </a:defRPr>
             </a:lvl1pPr>
             <a:lvl2pPr marL="342900" indent="0">
               <a:buNone/>
@@ -1657,7 +1782,16 @@
             </a:lvl9pPr>
           </a:lstStyle>
           <a:p>
-            <a:pPr lvl="0"/>
+            <a:pPr marL="0" lvl="0" indent="0" algn="l" defTabSz="685800" rtl="0" eaLnBrk="1" latinLnBrk="0" hangingPunct="1">
+              <a:lnSpc>
+                <a:spcPct val="90000"/>
+              </a:lnSpc>
+              <a:spcBef>
+                <a:spcPts val="1500"/>
+              </a:spcBef>
+              <a:buFontTx/>
+              <a:buNone/>
+            </a:pPr>
             <a:r>
               <a:rPr lang="en-US"/>
               <a:t>Click to edit Master text styles</a:t>
@@ -1677,39 +1811,39 @@
         </p:nvSpPr>
         <p:spPr>
           <a:xfrm>
-            <a:off x="4645026" y="1631156"/>
-            <a:ext cx="4041775" cy="2963466"/>
+            <a:off x="4594860" y="1880662"/>
+            <a:ext cx="3360420" cy="2748488"/>
           </a:xfrm>
         </p:spPr>
         <p:txBody>
           <a:bodyPr/>
           <a:lstStyle>
             <a:lvl1pPr>
-              <a:defRPr sz="1800"/>
+              <a:defRPr sz="1350"/>
             </a:lvl1pPr>
             <a:lvl2pPr>
-              <a:defRPr sz="1500"/>
+              <a:defRPr sz="1200"/>
             </a:lvl2pPr>
             <a:lvl3pPr>
-              <a:defRPr sz="1350"/>
+              <a:defRPr sz="1050"/>
             </a:lvl3pPr>
             <a:lvl4pPr>
-              <a:defRPr sz="1200"/>
+              <a:defRPr sz="1050"/>
             </a:lvl4pPr>
             <a:lvl5pPr>
-              <a:defRPr sz="1200"/>
+              <a:defRPr sz="1050"/>
             </a:lvl5pPr>
             <a:lvl6pPr>
-              <a:defRPr sz="1200"/>
+              <a:defRPr sz="1050"/>
             </a:lvl6pPr>
             <a:lvl7pPr>
-              <a:defRPr sz="1200"/>
+              <a:defRPr sz="1050"/>
             </a:lvl7pPr>
             <a:lvl8pPr>
-              <a:defRPr sz="1200"/>
+              <a:defRPr sz="1050"/>
             </a:lvl8pPr>
             <a:lvl9pPr>
-              <a:defRPr sz="1200"/>
+              <a:defRPr sz="1050"/>
             </a:lvl9pPr>
           </a:lstStyle>
           <a:p>
@@ -1746,6 +1880,7 @@
               <a:rPr lang="en-US"/>
               <a:t>Fifth level</a:t>
             </a:r>
+            <a:endParaRPr lang="en-US" dirty="0"/>
           </a:p>
         </p:txBody>
       </p:sp>
@@ -1766,7 +1901,7 @@
           <a:p>
             <a:fld id="{241EB5C9-1307-BA42-ABA2-0BC069CD8E7F}" type="datetimeFigureOut">
               <a:rPr lang="en-US" smtClean="0"/>
-              <a:t>1/2/22</a:t>
+              <a:t>10/6/2023</a:t>
             </a:fld>
             <a:endParaRPr lang="en-US"/>
           </a:p>
@@ -1817,7 +1952,7 @@
     </p:spTree>
     <p:extLst>
       <p:ext uri="{BB962C8B-B14F-4D97-AF65-F5344CB8AC3E}">
-        <p14:creationId xmlns:p14="http://schemas.microsoft.com/office/powerpoint/2010/main" val="2535793967"/>
+        <p14:creationId xmlns:p14="http://schemas.microsoft.com/office/powerpoint/2010/main" val="496942665"/>
       </p:ext>
     </p:extLst>
   </p:cSld>
@@ -1846,7 +1981,7 @@
       </p:grpSpPr>
       <p:sp>
         <p:nvSpPr>
-          <p:cNvPr id="2" name="Title 1"/>
+          <p:cNvPr id="6" name="Title 5"/>
           <p:cNvSpPr>
             <a:spLocks noGrp="1"/>
           </p:cNvSpPr>
@@ -1863,6 +1998,7 @@
               <a:rPr lang="en-US"/>
               <a:t>Click to edit Master title style</a:t>
             </a:r>
+            <a:endParaRPr lang="en-US" dirty="0"/>
           </a:p>
         </p:txBody>
       </p:sp>
@@ -1883,7 +2019,7 @@
           <a:p>
             <a:fld id="{241EB5C9-1307-BA42-ABA2-0BC069CD8E7F}" type="datetimeFigureOut">
               <a:rPr lang="en-US" smtClean="0"/>
-              <a:t>1/2/22</a:t>
+              <a:t>10/6/2023</a:t>
             </a:fld>
             <a:endParaRPr lang="en-US"/>
           </a:p>
@@ -1934,7 +2070,7 @@
     </p:spTree>
     <p:extLst>
       <p:ext uri="{BB962C8B-B14F-4D97-AF65-F5344CB8AC3E}">
-        <p14:creationId xmlns:p14="http://schemas.microsoft.com/office/powerpoint/2010/main" val="3472721253"/>
+        <p14:creationId xmlns:p14="http://schemas.microsoft.com/office/powerpoint/2010/main" val="3129622293"/>
       </p:ext>
     </p:extLst>
   </p:cSld>
@@ -1978,7 +2114,7 @@
           <a:p>
             <a:fld id="{241EB5C9-1307-BA42-ABA2-0BC069CD8E7F}" type="datetimeFigureOut">
               <a:rPr lang="en-US" smtClean="0"/>
-              <a:t>1/2/22</a:t>
+              <a:t>10/6/2023</a:t>
             </a:fld>
             <a:endParaRPr lang="en-US"/>
           </a:p>
@@ -2029,7 +2165,7 @@
     </p:spTree>
     <p:extLst>
       <p:ext uri="{BB962C8B-B14F-4D97-AF65-F5344CB8AC3E}">
-        <p14:creationId xmlns:p14="http://schemas.microsoft.com/office/powerpoint/2010/main" val="2130901097"/>
+        <p14:creationId xmlns:p14="http://schemas.microsoft.com/office/powerpoint/2010/main" val="2655737439"/>
       </p:ext>
     </p:extLst>
   </p:cSld>
@@ -2068,15 +2204,17 @@
         </p:nvSpPr>
         <p:spPr>
           <a:xfrm>
-            <a:off x="457201" y="204787"/>
-            <a:ext cx="3008313" cy="871538"/>
+            <a:off x="630936" y="342900"/>
+            <a:ext cx="2400300" cy="1200148"/>
           </a:xfrm>
         </p:spPr>
         <p:txBody>
-          <a:bodyPr anchor="b"/>
+          <a:bodyPr anchor="b">
+            <a:normAutofit/>
+          </a:bodyPr>
           <a:lstStyle>
-            <a:lvl1pPr algn="l">
-              <a:defRPr sz="1500" b="1"/>
+            <a:lvl1pPr>
+              <a:defRPr sz="2400" b="0" baseline="0"/>
             </a:lvl1pPr>
           </a:lstStyle>
           <a:p>
@@ -2084,6 +2222,7 @@
               <a:rPr lang="en-US"/>
               <a:t>Click to edit Master title style</a:t>
             </a:r>
+            <a:endParaRPr lang="en-US" dirty="0"/>
           </a:p>
         </p:txBody>
       </p:sp>
@@ -2099,39 +2238,39 @@
         </p:nvSpPr>
         <p:spPr>
           <a:xfrm>
-            <a:off x="3575050" y="204788"/>
-            <a:ext cx="5111750" cy="4389835"/>
+            <a:off x="3378200" y="514350"/>
+            <a:ext cx="4559300" cy="4114800"/>
           </a:xfrm>
         </p:spPr>
         <p:txBody>
           <a:bodyPr/>
           <a:lstStyle>
             <a:lvl1pPr>
-              <a:defRPr sz="2400"/>
+              <a:defRPr sz="1500"/>
             </a:lvl1pPr>
             <a:lvl2pPr>
-              <a:defRPr sz="2100"/>
+              <a:defRPr sz="1350"/>
             </a:lvl2pPr>
             <a:lvl3pPr>
-              <a:defRPr sz="1800"/>
+              <a:defRPr sz="1200"/>
             </a:lvl3pPr>
             <a:lvl4pPr>
-              <a:defRPr sz="1500"/>
+              <a:defRPr sz="1050"/>
             </a:lvl4pPr>
             <a:lvl5pPr>
-              <a:defRPr sz="1500"/>
+              <a:defRPr sz="1050"/>
             </a:lvl5pPr>
             <a:lvl6pPr>
-              <a:defRPr sz="1500"/>
+              <a:defRPr sz="1050"/>
             </a:lvl6pPr>
             <a:lvl7pPr>
-              <a:defRPr sz="1500"/>
+              <a:defRPr sz="1050"/>
             </a:lvl7pPr>
             <a:lvl8pPr>
-              <a:defRPr sz="1500"/>
+              <a:defRPr sz="1050"/>
             </a:lvl8pPr>
             <a:lvl9pPr>
-              <a:defRPr sz="1500"/>
+              <a:defRPr sz="1050"/>
             </a:lvl9pPr>
           </a:lstStyle>
           <a:p>
@@ -2168,6 +2307,7 @@
               <a:rPr lang="en-US"/>
               <a:t>Fifth level</a:t>
             </a:r>
+            <a:endParaRPr lang="en-US" dirty="0"/>
           </a:p>
         </p:txBody>
       </p:sp>
@@ -2183,16 +2323,24 @@
         </p:nvSpPr>
         <p:spPr>
           <a:xfrm>
-            <a:off x="457201" y="1076326"/>
-            <a:ext cx="3008313" cy="3518297"/>
+            <a:off x="630936" y="1574801"/>
+            <a:ext cx="2400300" cy="2857501"/>
           </a:xfrm>
         </p:spPr>
         <p:txBody>
-          <a:bodyPr/>
+          <a:bodyPr>
+            <a:normAutofit/>
+          </a:bodyPr>
           <a:lstStyle>
             <a:lvl1pPr marL="0" indent="0">
-              <a:buNone/>
-              <a:defRPr sz="1050"/>
+              <a:lnSpc>
+                <a:spcPct val="114000"/>
+              </a:lnSpc>
+              <a:spcBef>
+                <a:spcPts val="600"/>
+              </a:spcBef>
+              <a:buNone/>
+              <a:defRPr sz="975"/>
             </a:lvl1pPr>
             <a:lvl2pPr marL="342900" indent="0">
               <a:buNone/>
@@ -2253,7 +2401,7 @@
           <a:p>
             <a:fld id="{241EB5C9-1307-BA42-ABA2-0BC069CD8E7F}" type="datetimeFigureOut">
               <a:rPr lang="en-US" smtClean="0"/>
-              <a:t>1/2/22</a:t>
+              <a:t>10/6/2023</a:t>
             </a:fld>
             <a:endParaRPr lang="en-US"/>
           </a:p>
@@ -2304,7 +2452,7 @@
     </p:spTree>
     <p:extLst>
       <p:ext uri="{BB962C8B-B14F-4D97-AF65-F5344CB8AC3E}">
-        <p14:creationId xmlns:p14="http://schemas.microsoft.com/office/powerpoint/2010/main" val="3540895647"/>
+        <p14:creationId xmlns:p14="http://schemas.microsoft.com/office/powerpoint/2010/main" val="108242691"/>
       </p:ext>
     </p:extLst>
   </p:cSld>
@@ -2333,25 +2481,69 @@
       </p:grpSpPr>
       <p:sp>
         <p:nvSpPr>
-          <p:cNvPr id="2" name="Title 1"/>
-          <p:cNvSpPr>
-            <a:spLocks noGrp="1"/>
-          </p:cNvSpPr>
-          <p:nvPr>
-            <p:ph type="title"/>
-          </p:nvPr>
+          <p:cNvPr id="8" name="Rectangle 7"/>
+          <p:cNvSpPr/>
+          <p:nvPr/>
         </p:nvSpPr>
         <p:spPr>
           <a:xfrm>
-            <a:off x="1792288" y="3600450"/>
-            <a:ext cx="5486400" cy="425054"/>
+            <a:off x="0" y="3829050"/>
+            <a:ext cx="8469630" cy="1314450"/>
+          </a:xfrm>
+          <a:prstGeom prst="rect">
+            <a:avLst/>
+          </a:prstGeom>
+          <a:solidFill>
+            <a:srgbClr val="000000"/>
+          </a:solidFill>
+          <a:ln>
+            <a:noFill/>
+          </a:ln>
+        </p:spPr>
+        <p:style>
+          <a:lnRef idx="2">
+            <a:schemeClr val="accent1">
+              <a:shade val="50000"/>
+            </a:schemeClr>
+          </a:lnRef>
+          <a:fillRef idx="1">
+            <a:schemeClr val="accent1"/>
+          </a:fillRef>
+          <a:effectRef idx="0">
+            <a:schemeClr val="accent1"/>
+          </a:effectRef>
+          <a:fontRef idx="minor">
+            <a:schemeClr val="lt1"/>
+          </a:fontRef>
+        </p:style>
+      </p:sp>
+      <p:sp>
+        <p:nvSpPr>
+          <p:cNvPr id="2" name="Title 1"/>
+          <p:cNvSpPr>
+            <a:spLocks noGrp="1"/>
+          </p:cNvSpPr>
+          <p:nvPr>
+            <p:ph type="title"/>
+          </p:nvPr>
+        </p:nvSpPr>
+        <p:spPr>
+          <a:xfrm>
+            <a:off x="685800" y="3943350"/>
+            <a:ext cx="7486650" cy="685800"/>
           </a:xfrm>
         </p:spPr>
         <p:txBody>
-          <a:bodyPr anchor="b"/>
+          <a:bodyPr anchor="b">
+            <a:normAutofit/>
+          </a:bodyPr>
           <a:lstStyle>
-            <a:lvl1pPr algn="l">
-              <a:defRPr sz="1500" b="1"/>
+            <a:lvl1pPr>
+              <a:defRPr sz="2100" b="0">
+                <a:solidFill>
+                  <a:schemeClr val="bg1"/>
+                </a:solidFill>
+              </a:defRPr>
             </a:lvl1pPr>
           </a:lstStyle>
           <a:p>
@@ -2359,6 +2551,7 @@
               <a:rPr lang="en-US"/>
               <a:t>Click to edit Master title style</a:t>
             </a:r>
+            <a:endParaRPr lang="en-US" dirty="0"/>
           </a:p>
         </p:txBody>
       </p:sp>
@@ -2366,7 +2559,7 @@
         <p:nvSpPr>
           <p:cNvPr id="3" name="Picture Placeholder 2"/>
           <p:cNvSpPr>
-            <a:spLocks noGrp="1"/>
+            <a:spLocks noGrp="1" noChangeAspect="1"/>
           </p:cNvSpPr>
           <p:nvPr>
             <p:ph type="pic" idx="1"/>
@@ -2374,16 +2567,23 @@
         </p:nvSpPr>
         <p:spPr>
           <a:xfrm>
-            <a:off x="1792288" y="459581"/>
-            <a:ext cx="5486400" cy="3086100"/>
+            <a:off x="0" y="1"/>
+            <a:ext cx="8469630" cy="3846692"/>
           </a:xfrm>
+          <a:solidFill>
+            <a:schemeClr val="accent1"/>
+          </a:solidFill>
         </p:spPr>
         <p:txBody>
-          <a:bodyPr/>
+          <a:bodyPr anchor="t"/>
           <a:lstStyle>
             <a:lvl1pPr marL="0" indent="0">
               <a:buNone/>
-              <a:defRPr sz="2400"/>
+              <a:defRPr sz="2400">
+                <a:solidFill>
+                  <a:schemeClr val="bg1"/>
+                </a:solidFill>
+              </a:defRPr>
             </a:lvl1pPr>
             <a:lvl2pPr marL="342900" indent="0">
               <a:buNone/>
@@ -2419,7 +2619,11 @@
             </a:lvl9pPr>
           </a:lstStyle>
           <a:p>
-            <a:endParaRPr lang="en-US"/>
+            <a:r>
+              <a:rPr lang="en-US"/>
+              <a:t>Click icon to add picture</a:t>
+            </a:r>
+            <a:endParaRPr lang="en-US" dirty="0"/>
           </a:p>
         </p:txBody>
       </p:sp>
@@ -2435,16 +2639,30 @@
         </p:nvSpPr>
         <p:spPr>
           <a:xfrm>
-            <a:off x="1792288" y="4025503"/>
-            <a:ext cx="5486400" cy="603647"/>
+            <a:off x="685800" y="4581442"/>
+            <a:ext cx="7486650" cy="447758"/>
           </a:xfrm>
         </p:spPr>
         <p:txBody>
-          <a:bodyPr/>
+          <a:bodyPr>
+            <a:normAutofit/>
+          </a:bodyPr>
           <a:lstStyle>
             <a:lvl1pPr marL="0" indent="0">
-              <a:buNone/>
-              <a:defRPr sz="1050"/>
+              <a:lnSpc>
+                <a:spcPct val="100000"/>
+              </a:lnSpc>
+              <a:spcBef>
+                <a:spcPts val="600"/>
+              </a:spcBef>
+              <a:buNone/>
+              <a:defRPr sz="975">
+                <a:solidFill>
+                  <a:schemeClr val="bg1">
+                    <a:lumMod val="85000"/>
+                  </a:schemeClr>
+                </a:solidFill>
+              </a:defRPr>
             </a:lvl1pPr>
             <a:lvl2pPr marL="342900" indent="0">
               <a:buNone/>
@@ -2505,7 +2723,7 @@
           <a:p>
             <a:fld id="{241EB5C9-1307-BA42-ABA2-0BC069CD8E7F}" type="datetimeFigureOut">
               <a:rPr lang="en-US" smtClean="0"/>
-              <a:t>1/2/22</a:t>
+              <a:t>10/6/2023</a:t>
             </a:fld>
             <a:endParaRPr lang="en-US"/>
           </a:p>
@@ -2556,7 +2774,7 @@
     </p:spTree>
     <p:extLst>
       <p:ext uri="{BB962C8B-B14F-4D97-AF65-F5344CB8AC3E}">
-        <p14:creationId xmlns:p14="http://schemas.microsoft.com/office/powerpoint/2010/main" val="3566899855"/>
+        <p14:creationId xmlns:p14="http://schemas.microsoft.com/office/powerpoint/2010/main" val="1101802678"/>
       </p:ext>
     </p:extLst>
   </p:cSld>
@@ -2590,25 +2808,65 @@
       </p:grpSpPr>
       <p:sp>
         <p:nvSpPr>
-          <p:cNvPr id="2" name="Title Placeholder 1"/>
-          <p:cNvSpPr>
-            <a:spLocks noGrp="1"/>
-          </p:cNvSpPr>
-          <p:nvPr>
-            <p:ph type="title"/>
-          </p:nvPr>
+          <p:cNvPr id="7" name="Rectangle 6"/>
+          <p:cNvSpPr/>
+          <p:nvPr/>
         </p:nvSpPr>
         <p:spPr>
           <a:xfrm>
-            <a:off x="457200" y="205979"/>
-            <a:ext cx="8229600" cy="857250"/>
+            <a:off x="8469630" y="0"/>
+            <a:ext cx="685800" cy="5143500"/>
+          </a:xfrm>
+          <a:prstGeom prst="rect">
+            <a:avLst/>
+          </a:prstGeom>
+          <a:solidFill>
+            <a:schemeClr val="tx2">
+              <a:lumMod val="75000"/>
+            </a:schemeClr>
+          </a:solidFill>
+          <a:ln>
+            <a:noFill/>
+          </a:ln>
+        </p:spPr>
+        <p:style>
+          <a:lnRef idx="2">
+            <a:schemeClr val="accent1">
+              <a:shade val="50000"/>
+            </a:schemeClr>
+          </a:lnRef>
+          <a:fillRef idx="1">
+            <a:schemeClr val="accent1"/>
+          </a:fillRef>
+          <a:effectRef idx="0">
+            <a:schemeClr val="accent1"/>
+          </a:effectRef>
+          <a:fontRef idx="minor">
+            <a:schemeClr val="lt1"/>
+          </a:fontRef>
+        </p:style>
+      </p:sp>
+      <p:sp>
+        <p:nvSpPr>
+          <p:cNvPr id="2" name="Title Placeholder 1"/>
+          <p:cNvSpPr>
+            <a:spLocks noGrp="1"/>
+          </p:cNvSpPr>
+          <p:nvPr>
+            <p:ph type="title"/>
+          </p:nvPr>
+        </p:nvSpPr>
+        <p:spPr>
+          <a:xfrm>
+            <a:off x="946404" y="274320"/>
+            <a:ext cx="7269480" cy="994172"/>
           </a:xfrm>
           <a:prstGeom prst="rect">
             <a:avLst/>
           </a:prstGeom>
         </p:spPr>
         <p:txBody>
-          <a:bodyPr anchor="ctr" bIns="45720" lIns="91440" rIns="91440" rtlCol="0" tIns="45720" vert="horz">
+          <a:bodyPr anchor="b" bIns="45720" lIns="91440" rIns="91440" rtlCol="0" tIns="45720" vert="horz">
             <a:normAutofit/>
           </a:bodyPr>
           <a:lstStyle/>
@@ -2617,6 +2875,7 @@
               <a:rPr lang="en-US"/>
               <a:t>Click to edit Master title style</a:t>
             </a:r>
+            <a:endParaRPr dirty="0" lang="en-US"/>
           </a:p>
         </p:txBody>
       </p:sp>
@@ -2632,8 +2891,8 @@
         </p:nvSpPr>
         <p:spPr>
           <a:xfrm>
-            <a:off x="457200" y="1200151"/>
-            <a:ext cx="8229600" cy="3394472"/>
+            <a:off x="946404" y="1371600"/>
+            <a:ext cx="6446520" cy="3263503"/>
           </a:xfrm>
           <a:prstGeom prst="rect">
             <a:avLst/>
@@ -2678,6 +2937,7 @@
               <a:rPr lang="en-US"/>
               <a:t>Fifth level</a:t>
             </a:r>
+            <a:endParaRPr dirty="0" lang="en-US"/>
           </a:p>
         </p:txBody>
       </p:sp>
@@ -2692,9 +2952,9 @@
           </p:nvPr>
         </p:nvSpPr>
         <p:spPr>
-          <a:xfrm>
-            <a:off x="457200" y="4767263"/>
-            <a:ext cx="2133600" cy="273844"/>
+          <a:xfrm rot="16200000">
+            <a:off x="8098157" y="748903"/>
+            <a:ext cx="1428749" cy="273844"/>
           </a:xfrm>
           <a:prstGeom prst="rect">
             <a:avLst/>
@@ -2703,11 +2963,12 @@
         <p:txBody>
           <a:bodyPr anchor="ctr" bIns="45720" lIns="91440" rIns="91440" rtlCol="0" tIns="45720" vert="horz"/>
           <a:lstStyle>
-            <a:lvl1pPr algn="l">
-              <a:defRPr sz="900">
+            <a:lvl1pPr algn="r">
+              <a:defRPr b="0" sz="788">
                 <a:solidFill>
-                  <a:schemeClr val="tx1">
-                    <a:tint val="75000"/>
+                  <a:schemeClr val="tx2">
+                    <a:lumMod val="20000"/>
+                    <a:lumOff val="80000"/>
                   </a:schemeClr>
                 </a:solidFill>
               </a:defRPr>
@@ -2716,7 +2977,7 @@
           <a:p>
             <a:fld id="{241EB5C9-1307-BA42-ABA2-0BC069CD8E7F}" type="datetimeFigureOut">
               <a:rPr lang="en-US" smtClean="0"/>
-              <a:t>1/2/22</a:t>
+              <a:t>10/6/2023</a:t>
             </a:fld>
             <a:endParaRPr lang="en-US"/>
           </a:p>
@@ -2733,9 +2994,9 @@
           </p:nvPr>
         </p:nvSpPr>
         <p:spPr>
-          <a:xfrm>
-            <a:off x="3124200" y="4767263"/>
-            <a:ext cx="2895600" cy="273844"/>
+          <a:xfrm rot="16200000">
+            <a:off x="7469506" y="3034903"/>
+            <a:ext cx="2686050" cy="273844"/>
           </a:xfrm>
           <a:prstGeom prst="rect">
             <a:avLst/>
@@ -2744,11 +3005,12 @@
         <p:txBody>
           <a:bodyPr anchor="ctr" bIns="45720" lIns="91440" rIns="91440" rtlCol="0" tIns="45720" vert="horz"/>
           <a:lstStyle>
-            <a:lvl1pPr algn="ctr">
-              <a:defRPr sz="900">
+            <a:lvl1pPr algn="l">
+              <a:defRPr sz="788">
                 <a:solidFill>
-                  <a:schemeClr val="tx1">
-                    <a:tint val="75000"/>
+                  <a:schemeClr val="tx2">
+                    <a:lumMod val="20000"/>
+                    <a:lumOff val="80000"/>
                   </a:schemeClr>
                 </a:solidFill>
               </a:defRPr>
@@ -2771,21 +3033,24 @@
         </p:nvSpPr>
         <p:spPr>
           <a:xfrm>
-            <a:off x="6553200" y="4767263"/>
-            <a:ext cx="2133600" cy="273844"/>
+            <a:off x="8469630" y="4629150"/>
+            <a:ext cx="685800" cy="445294"/>
           </a:xfrm>
           <a:prstGeom prst="rect">
             <a:avLst/>
           </a:prstGeom>
         </p:spPr>
         <p:txBody>
-          <a:bodyPr anchor="ctr" bIns="45720" lIns="91440" rIns="91440" rtlCol="0" tIns="45720" vert="horz"/>
+          <a:bodyPr anchor="ctr" bIns="45720" lIns="45720" rIns="45720" rtlCol="0" tIns="45720" vert="horz">
+            <a:normAutofit/>
+          </a:bodyPr>
           <a:lstStyle>
-            <a:lvl1pPr algn="r">
-              <a:defRPr sz="900">
+            <a:lvl1pPr algn="ctr">
+              <a:defRPr sz="2700">
                 <a:solidFill>
-                  <a:schemeClr val="tx1">
-                    <a:tint val="75000"/>
+                  <a:schemeClr val="tx2">
+                    <a:lumMod val="60000"/>
+                    <a:lumOff val="40000"/>
                   </a:schemeClr>
                 </a:solidFill>
               </a:defRPr>
@@ -2803,32 +3068,35 @@
     </p:spTree>
     <p:extLst>
       <p:ext uri="{BB962C8B-B14F-4D97-AF65-F5344CB8AC3E}">
-        <p14:creationId xmlns:p14="http://schemas.microsoft.com/office/powerpoint/2010/main" val="3676200875"/>
+        <p14:creationId xmlns:p14="http://schemas.microsoft.com/office/powerpoint/2010/main" val="1719892922"/>
       </p:ext>
     </p:extLst>
   </p:cSld>
   <p:clrMap accent1="accent1" accent2="accent2" accent3="accent3" accent4="accent4" accent5="accent5" accent6="accent6" bg1="lt1" bg2="lt2" folHlink="folHlink" hlink="hlink" tx1="dk1" tx2="dk2"/>
   <p:sldLayoutIdLst>
-    <p:sldLayoutId id="2147483649" r:id="rId1"/>
-    <p:sldLayoutId id="2147483650" r:id="rId2"/>
-    <p:sldLayoutId id="2147483651" r:id="rId3"/>
-    <p:sldLayoutId id="2147483652" r:id="rId4"/>
-    <p:sldLayoutId id="2147483653" r:id="rId5"/>
-    <p:sldLayoutId id="2147483654" r:id="rId6"/>
-    <p:sldLayoutId id="2147483655" r:id="rId7"/>
-    <p:sldLayoutId id="2147483656" r:id="rId8"/>
-    <p:sldLayoutId id="2147483657" r:id="rId9"/>
-    <p:sldLayoutId id="2147483658" r:id="rId10"/>
-    <p:sldLayoutId id="2147483659" r:id="rId11"/>
+    <p:sldLayoutId id="2147483661" r:id="rId1"/>
+    <p:sldLayoutId id="2147483662" r:id="rId2"/>
+    <p:sldLayoutId id="2147483663" r:id="rId3"/>
+    <p:sldLayoutId id="2147483664" r:id="rId4"/>
+    <p:sldLayoutId id="2147483665" r:id="rId5"/>
+    <p:sldLayoutId id="2147483666" r:id="rId6"/>
+    <p:sldLayoutId id="2147483667" r:id="rId7"/>
+    <p:sldLayoutId id="2147483668" r:id="rId8"/>
+    <p:sldLayoutId id="2147483669" r:id="rId9"/>
+    <p:sldLayoutId id="2147483670" r:id="rId10"/>
+    <p:sldLayoutId id="2147483671" r:id="rId11"/>
   </p:sldLayoutIdLst>
   <p:txStyles>
     <p:titleStyle>
-      <a:lvl1pPr algn="ctr" defTabSz="342900" eaLnBrk="1" hangingPunct="1" latinLnBrk="0" rtl="0">
+      <a:lvl1pPr algn="l" defTabSz="685800" eaLnBrk="1" hangingPunct="1" latinLnBrk="0" rtl="0">
+        <a:lnSpc>
+          <a:spcPct val="90000"/>
+        </a:lnSpc>
         <a:spcBef>
           <a:spcPct val="0"/>
         </a:spcBef>
         <a:buNone/>
-        <a:defRPr kern="1200" sz="3300">
+        <a:defRPr baseline="0" kern="1200" spc="-38" sz="3300">
           <a:solidFill>
             <a:schemeClr val="tx1"/>
           </a:solidFill>
@@ -2839,13 +3107,23 @@
       </a:lvl1pPr>
     </p:titleStyle>
     <p:bodyStyle>
-      <a:lvl1pPr algn="l" defTabSz="342900" eaLnBrk="1" hangingPunct="1" indent="-342900" latinLnBrk="0" marL="342900" rtl="0">
+      <a:lvl1pPr algn="l" defTabSz="685800" eaLnBrk="1" hangingPunct="1" indent="-137160" latinLnBrk="0" marL="137160" rtl="0">
+        <a:lnSpc>
+          <a:spcPct val="95000"/>
+        </a:lnSpc>
         <a:spcBef>
-          <a:spcPct val="20000"/>
+          <a:spcPts val="1050"/>
         </a:spcBef>
-        <a:buFont typeface="Arial"/>
+        <a:spcAft>
+          <a:spcPts val="150"/>
+        </a:spcAft>
+        <a:buClr>
+          <a:schemeClr val="accent1"/>
+        </a:buClr>
+        <a:buSzPct val="80000"/>
+        <a:buFont charset="0" pitchFamily="34" typeface="Arial"/>
         <a:buChar char="•"/>
-        <a:defRPr kern="1200" sz="2400">
+        <a:defRPr baseline="0" kern="1200" spc="8" sz="1350">
           <a:solidFill>
             <a:schemeClr val="tx1"/>
           </a:solidFill>
@@ -2854,120 +3132,216 @@
           <a:cs typeface="+mn-cs"/>
         </a:defRPr>
       </a:lvl1pPr>
-      <a:lvl2pPr algn="l" defTabSz="342900" eaLnBrk="1" hangingPunct="1" indent="-342900" latinLnBrk="0" marL="685800" rtl="0">
+      <a:lvl2pPr algn="l" defTabSz="685800" eaLnBrk="1" hangingPunct="1" indent="-137160" latinLnBrk="0" marL="342900" rtl="0">
+        <a:lnSpc>
+          <a:spcPct val="90000"/>
+        </a:lnSpc>
         <a:spcBef>
-          <a:spcPct val="20000"/>
+          <a:spcPts val="225"/>
         </a:spcBef>
-        <a:buFont typeface="Arial"/>
-        <a:buChar char="–"/>
-        <a:defRPr kern="1200" sz="2100">
+        <a:spcAft>
+          <a:spcPts val="225"/>
+        </a:spcAft>
+        <a:buClr>
+          <a:schemeClr val="accent1"/>
+        </a:buClr>
+        <a:buFont charset="2" pitchFamily="18" typeface="Wingdings 2"/>
+        <a:buChar char=""/>
+        <a:defRPr kern="1200" sz="1200">
           <a:solidFill>
-            <a:schemeClr val="tx1"/>
+            <a:schemeClr val="tx1">
+              <a:lumMod val="85000"/>
+              <a:lumOff val="15000"/>
+            </a:schemeClr>
           </a:solidFill>
           <a:latin typeface="+mn-lt"/>
           <a:ea typeface="+mn-ea"/>
           <a:cs typeface="+mn-cs"/>
         </a:defRPr>
       </a:lvl2pPr>
-      <a:lvl3pPr algn="l" defTabSz="342900" eaLnBrk="1" hangingPunct="1" indent="-342900" latinLnBrk="0" marL="1028700" rtl="0">
+      <a:lvl3pPr algn="l" defTabSz="685800" eaLnBrk="1" hangingPunct="1" indent="-137160" latinLnBrk="0" marL="548640" rtl="0">
+        <a:lnSpc>
+          <a:spcPct val="90000"/>
+        </a:lnSpc>
         <a:spcBef>
-          <a:spcPct val="20000"/>
+          <a:spcPts val="225"/>
         </a:spcBef>
-        <a:buFont typeface="Arial"/>
-        <a:buChar char="•"/>
-        <a:defRPr kern="1200" sz="1800">
+        <a:spcAft>
+          <a:spcPts val="225"/>
+        </a:spcAft>
+        <a:buClr>
+          <a:schemeClr val="accent1"/>
+        </a:buClr>
+        <a:buFont charset="2" pitchFamily="18" typeface="Wingdings 2"/>
+        <a:buChar char=""/>
+        <a:defRPr kern="1200" sz="1050">
           <a:solidFill>
-            <a:schemeClr val="tx1"/>
+            <a:schemeClr val="tx1">
+              <a:lumMod val="85000"/>
+              <a:lumOff val="15000"/>
+            </a:schemeClr>
           </a:solidFill>
           <a:latin typeface="+mn-lt"/>
           <a:ea typeface="+mn-ea"/>
           <a:cs typeface="+mn-cs"/>
         </a:defRPr>
       </a:lvl3pPr>
-      <a:lvl4pPr algn="l" defTabSz="342900" eaLnBrk="1" hangingPunct="1" indent="-342900" latinLnBrk="0" marL="1371600" rtl="0">
+      <a:lvl4pPr algn="l" defTabSz="685800" eaLnBrk="1" hangingPunct="1" indent="-137160" latinLnBrk="0" marL="754380" rtl="0">
+        <a:lnSpc>
+          <a:spcPct val="90000"/>
+        </a:lnSpc>
         <a:spcBef>
-          <a:spcPct val="20000"/>
+          <a:spcPts val="225"/>
         </a:spcBef>
-        <a:buFont typeface="Arial"/>
-        <a:buChar char="–"/>
-        <a:defRPr kern="1200" sz="1500">
+        <a:spcAft>
+          <a:spcPts val="225"/>
+        </a:spcAft>
+        <a:buClr>
+          <a:schemeClr val="accent1"/>
+        </a:buClr>
+        <a:buFont charset="2" pitchFamily="18" typeface="Wingdings 2"/>
+        <a:buChar char=""/>
+        <a:defRPr kern="1200" sz="1050">
           <a:solidFill>
-            <a:schemeClr val="tx1"/>
+            <a:schemeClr val="tx1">
+              <a:lumMod val="85000"/>
+              <a:lumOff val="15000"/>
+            </a:schemeClr>
           </a:solidFill>
           <a:latin typeface="+mn-lt"/>
           <a:ea typeface="+mn-ea"/>
           <a:cs typeface="+mn-cs"/>
         </a:defRPr>
       </a:lvl4pPr>
-      <a:lvl5pPr algn="l" defTabSz="342900" eaLnBrk="1" hangingPunct="1" indent="-342900" latinLnBrk="0" marL="1714500" rtl="0">
+      <a:lvl5pPr algn="l" defTabSz="685800" eaLnBrk="1" hangingPunct="1" indent="-137160" latinLnBrk="0" marL="960120" rtl="0">
+        <a:lnSpc>
+          <a:spcPct val="90000"/>
+        </a:lnSpc>
         <a:spcBef>
-          <a:spcPct val="20000"/>
+          <a:spcPts val="225"/>
         </a:spcBef>
-        <a:buFont typeface="Arial"/>
-        <a:buChar char="»"/>
-        <a:defRPr kern="1200" sz="1500">
+        <a:spcAft>
+          <a:spcPts val="225"/>
+        </a:spcAft>
+        <a:buClr>
+          <a:schemeClr val="accent1"/>
+        </a:buClr>
+        <a:buFont charset="2" pitchFamily="18" typeface="Wingdings 2"/>
+        <a:buChar char=""/>
+        <a:defRPr kern="1200" sz="1050">
           <a:solidFill>
-            <a:schemeClr val="tx1"/>
+            <a:schemeClr val="tx1">
+              <a:lumMod val="85000"/>
+              <a:lumOff val="15000"/>
+            </a:schemeClr>
           </a:solidFill>
           <a:latin typeface="+mn-lt"/>
           <a:ea typeface="+mn-ea"/>
           <a:cs typeface="+mn-cs"/>
         </a:defRPr>
       </a:lvl5pPr>
-      <a:lvl6pPr algn="l" defTabSz="342900" eaLnBrk="1" hangingPunct="1" indent="-342900" latinLnBrk="0" marL="2057400" rtl="0">
+      <a:lvl6pPr algn="l" defTabSz="685800" eaLnBrk="1" hangingPunct="1" indent="-171450" latinLnBrk="0" marL="1200000" rtl="0">
+        <a:lnSpc>
+          <a:spcPct val="90000"/>
+        </a:lnSpc>
         <a:spcBef>
-          <a:spcPct val="20000"/>
+          <a:spcPts val="225"/>
         </a:spcBef>
-        <a:buFont typeface="Arial"/>
-        <a:buChar char="•"/>
-        <a:defRPr kern="1200" sz="1500">
+        <a:spcAft>
+          <a:spcPts val="225"/>
+        </a:spcAft>
+        <a:buClr>
+          <a:schemeClr val="accent1"/>
+        </a:buClr>
+        <a:buFont charset="2" pitchFamily="18" typeface="Wingdings 2"/>
+        <a:buChar char=""/>
+        <a:defRPr kern="1200" sz="1050">
           <a:solidFill>
-            <a:schemeClr val="tx1"/>
+            <a:schemeClr val="tx1">
+              <a:lumMod val="85000"/>
+              <a:lumOff val="15000"/>
+            </a:schemeClr>
           </a:solidFill>
           <a:latin typeface="+mn-lt"/>
           <a:ea typeface="+mn-ea"/>
           <a:cs typeface="+mn-cs"/>
         </a:defRPr>
       </a:lvl6pPr>
-      <a:lvl7pPr algn="l" defTabSz="342900" eaLnBrk="1" hangingPunct="1" indent="-342900" latinLnBrk="0" marL="2400300" rtl="0">
+      <a:lvl7pPr algn="l" defTabSz="685800" eaLnBrk="1" hangingPunct="1" indent="-171450" latinLnBrk="0" marL="1425000" rtl="0">
+        <a:lnSpc>
+          <a:spcPct val="90000"/>
+        </a:lnSpc>
         <a:spcBef>
-          <a:spcPct val="20000"/>
+          <a:spcPts val="225"/>
         </a:spcBef>
-        <a:buFont typeface="Arial"/>
-        <a:buChar char="•"/>
-        <a:defRPr kern="1200" sz="1500">
+        <a:spcAft>
+          <a:spcPts val="225"/>
+        </a:spcAft>
+        <a:buClr>
+          <a:schemeClr val="accent1"/>
+        </a:buClr>
+        <a:buFont charset="2" pitchFamily="18" typeface="Wingdings 2"/>
+        <a:buChar char=""/>
+        <a:defRPr kern="1200" sz="1050">
           <a:solidFill>
-            <a:schemeClr val="tx1"/>
+            <a:schemeClr val="tx1">
+              <a:lumMod val="85000"/>
+              <a:lumOff val="15000"/>
+            </a:schemeClr>
           </a:solidFill>
           <a:latin typeface="+mn-lt"/>
           <a:ea typeface="+mn-ea"/>
           <a:cs typeface="+mn-cs"/>
         </a:defRPr>
       </a:lvl7pPr>
-      <a:lvl8pPr algn="l" defTabSz="342900" eaLnBrk="1" hangingPunct="1" indent="-342900" latinLnBrk="0" marL="2743200" rtl="0">
+      <a:lvl8pPr algn="l" defTabSz="685800" eaLnBrk="1" hangingPunct="1" indent="-171450" latinLnBrk="0" marL="1650000" rtl="0">
+        <a:lnSpc>
+          <a:spcPct val="90000"/>
+        </a:lnSpc>
         <a:spcBef>
-          <a:spcPct val="20000"/>
+          <a:spcPts val="225"/>
         </a:spcBef>
-        <a:buFont typeface="Arial"/>
-        <a:buChar char="•"/>
-        <a:defRPr kern="1200" sz="1500">
+        <a:spcAft>
+          <a:spcPts val="225"/>
+        </a:spcAft>
+        <a:buClr>
+          <a:schemeClr val="accent1"/>
+        </a:buClr>
+        <a:buFont charset="2" pitchFamily="18" typeface="Wingdings 2"/>
+        <a:buChar char=""/>
+        <a:defRPr kern="1200" sz="1050">
           <a:solidFill>
-            <a:schemeClr val="tx1"/>
+            <a:schemeClr val="tx1">
+              <a:lumMod val="85000"/>
+              <a:lumOff val="15000"/>
+            </a:schemeClr>
           </a:solidFill>
           <a:latin typeface="+mn-lt"/>
           <a:ea typeface="+mn-ea"/>
           <a:cs typeface="+mn-cs"/>
         </a:defRPr>
       </a:lvl8pPr>
-      <a:lvl9pPr algn="l" defTabSz="342900" eaLnBrk="1" hangingPunct="1" indent="-342900" latinLnBrk="0" marL="3086100" rtl="0">
+      <a:lvl9pPr algn="l" defTabSz="685800" eaLnBrk="1" hangingPunct="1" indent="-171450" latinLnBrk="0" marL="1875000" rtl="0">
+        <a:lnSpc>
+          <a:spcPct val="90000"/>
+        </a:lnSpc>
         <a:spcBef>
-          <a:spcPct val="20000"/>
+          <a:spcPts val="225"/>
         </a:spcBef>
-        <a:buFont typeface="Arial"/>
-        <a:buChar char="•"/>
-        <a:defRPr kern="1200" sz="1500">
+        <a:spcAft>
+          <a:spcPts val="225"/>
+        </a:spcAft>
+        <a:buClr>
+          <a:schemeClr val="accent1"/>
+        </a:buClr>
+        <a:buFont charset="2" pitchFamily="18" typeface="Wingdings 2"/>
+        <a:buChar char=""/>
+        <a:defRPr kern="1200" sz="1050">
           <a:solidFill>
-            <a:schemeClr val="tx1"/>
+            <a:schemeClr val="tx1">
+              <a:lumMod val="85000"/>
+              <a:lumOff val="15000"/>
+            </a:schemeClr>
           </a:solidFill>
           <a:latin typeface="+mn-lt"/>
           <a:ea typeface="+mn-ea"/>
@@ -2979,7 +3353,7 @@
       <a:defPPr>
         <a:defRPr lang="en-US"/>
       </a:defPPr>
-      <a:lvl1pPr algn="l" defTabSz="342900" eaLnBrk="1" hangingPunct="1" latinLnBrk="0" marL="0" rtl="0">
+      <a:lvl1pPr algn="l" defTabSz="685800" eaLnBrk="1" hangingPunct="1" latinLnBrk="0" marL="0" rtl="0">
         <a:defRPr kern="1200" sz="1350">
           <a:solidFill>
             <a:schemeClr val="tx1"/>
@@ -2989,7 +3363,7 @@
           <a:cs typeface="+mn-cs"/>
         </a:defRPr>
       </a:lvl1pPr>
-      <a:lvl2pPr algn="l" defTabSz="342900" eaLnBrk="1" hangingPunct="1" latinLnBrk="0" marL="342900" rtl="0">
+      <a:lvl2pPr algn="l" defTabSz="685800" eaLnBrk="1" hangingPunct="1" latinLnBrk="0" marL="342900" rtl="0">
         <a:defRPr kern="1200" sz="1350">
           <a:solidFill>
             <a:schemeClr val="tx1"/>
@@ -2999,7 +3373,7 @@
           <a:cs typeface="+mn-cs"/>
         </a:defRPr>
       </a:lvl2pPr>
-      <a:lvl3pPr algn="l" defTabSz="342900" eaLnBrk="1" hangingPunct="1" latinLnBrk="0" marL="685800" rtl="0">
+      <a:lvl3pPr algn="l" defTabSz="685800" eaLnBrk="1" hangingPunct="1" latinLnBrk="0" marL="685800" rtl="0">
         <a:defRPr kern="1200" sz="1350">
           <a:solidFill>
             <a:schemeClr val="tx1"/>
@@ -3009,7 +3383,7 @@
           <a:cs typeface="+mn-cs"/>
         </a:defRPr>
       </a:lvl3pPr>
-      <a:lvl4pPr algn="l" defTabSz="342900" eaLnBrk="1" hangingPunct="1" latinLnBrk="0" marL="1028700" rtl="0">
+      <a:lvl4pPr algn="l" defTabSz="685800" eaLnBrk="1" hangingPunct="1" latinLnBrk="0" marL="1028700" rtl="0">
         <a:defRPr kern="1200" sz="1350">
           <a:solidFill>
             <a:schemeClr val="tx1"/>
@@ -3019,7 +3393,7 @@
           <a:cs typeface="+mn-cs"/>
         </a:defRPr>
       </a:lvl4pPr>
-      <a:lvl5pPr algn="l" defTabSz="342900" eaLnBrk="1" hangingPunct="1" latinLnBrk="0" marL="1371600" rtl="0">
+      <a:lvl5pPr algn="l" defTabSz="685800" eaLnBrk="1" hangingPunct="1" latinLnBrk="0" marL="1371600" rtl="0">
         <a:defRPr kern="1200" sz="1350">
           <a:solidFill>
             <a:schemeClr val="tx1"/>
@@ -3029,7 +3403,7 @@
           <a:cs typeface="+mn-cs"/>
         </a:defRPr>
       </a:lvl5pPr>
-      <a:lvl6pPr algn="l" defTabSz="342900" eaLnBrk="1" hangingPunct="1" latinLnBrk="0" marL="1714500" rtl="0">
+      <a:lvl6pPr algn="l" defTabSz="685800" eaLnBrk="1" hangingPunct="1" latinLnBrk="0" marL="1714500" rtl="0">
         <a:defRPr kern="1200" sz="1350">
           <a:solidFill>
             <a:schemeClr val="tx1"/>
@@ -3039,7 +3413,7 @@
           <a:cs typeface="+mn-cs"/>
         </a:defRPr>
       </a:lvl6pPr>
-      <a:lvl7pPr algn="l" defTabSz="342900" eaLnBrk="1" hangingPunct="1" latinLnBrk="0" marL="2057400" rtl="0">
+      <a:lvl7pPr algn="l" defTabSz="685800" eaLnBrk="1" hangingPunct="1" latinLnBrk="0" marL="2057400" rtl="0">
         <a:defRPr kern="1200" sz="1350">
           <a:solidFill>
             <a:schemeClr val="tx1"/>
@@ -3049,7 +3423,7 @@
           <a:cs typeface="+mn-cs"/>
         </a:defRPr>
       </a:lvl7pPr>
-      <a:lvl8pPr algn="l" defTabSz="342900" eaLnBrk="1" hangingPunct="1" latinLnBrk="0" marL="2400300" rtl="0">
+      <a:lvl8pPr algn="l" defTabSz="685800" eaLnBrk="1" hangingPunct="1" latinLnBrk="0" marL="2400300" rtl="0">
         <a:defRPr kern="1200" sz="1350">
           <a:solidFill>
             <a:schemeClr val="tx1"/>
@@ -3059,7 +3433,7 @@
           <a:cs typeface="+mn-cs"/>
         </a:defRPr>
       </a:lvl8pPr>
-      <a:lvl9pPr algn="l" defTabSz="342900" eaLnBrk="1" hangingPunct="1" latinLnBrk="0" marL="2743200" rtl="0">
+      <a:lvl9pPr algn="l" defTabSz="685800" eaLnBrk="1" hangingPunct="1" latinLnBrk="0" marL="2743200" rtl="0">
         <a:defRPr kern="1200" sz="1350">
           <a:solidFill>
             <a:schemeClr val="tx1"/>
@@ -3103,8 +3477,8 @@
         </p:nvSpPr>
         <p:spPr>
           <a:xfrm>
-            <a:off x="685800" y="1597819"/>
-            <a:ext cx="7772400" cy="1102519"/>
+            <a:off x="946404" y="569214"/>
+            <a:ext cx="7063740" cy="3031236"/>
           </a:xfrm>
         </p:spPr>
         <p:txBody>
@@ -3133,8 +3507,8 @@
         </p:nvSpPr>
         <p:spPr>
           <a:xfrm>
-            <a:off x="1371600" y="2914650"/>
-            <a:ext cx="6400800" cy="1314450"/>
+            <a:off x="946404" y="3600450"/>
+            <a:ext cx="7063740" cy="1268730"/>
           </a:xfrm>
         </p:spPr>
         <p:txBody>
@@ -3191,25 +3565,7 @@
             </a:pPr>
             <a:r>
               <a:rPr/>
-              <a:t>::: {.content-visble when-format=“pdf”, “pptx”, “docx”}</a:t>
-            </a:r>
-          </a:p>
-          <a:p>
-            <a:pPr lvl="0" indent="0" marL="0">
-              <a:buNone/>
-            </a:pPr>
-            <a:r>
-              <a:rPr/>
               <a:t>Links to Viktoria’s portfolio pieces are only available in the html output.</a:t>
-            </a:r>
-          </a:p>
-          <a:p>
-            <a:pPr lvl="0" indent="0" marL="0">
-              <a:buNone/>
-            </a:pPr>
-            <a:r>
-              <a:rPr/>
-              <a:t>:::</a:t>
             </a:r>
           </a:p>
         </p:txBody>
@@ -3220,93 +3576,58 @@
 </file>
 
 <file path=ppt/theme/theme1.xml><?xml version="1.0" encoding="utf-8"?>
-<a:theme xmlns:a="http://schemas.openxmlformats.org/drawingml/2006/main" name="Office Theme">
+<a:theme xmlns:a="http://schemas.openxmlformats.org/drawingml/2006/main" name="View">
   <a:themeElements>
-    <a:clrScheme name="Office">
+    <a:clrScheme name="View">
       <a:dk1>
-        <a:sysClr val="windowText" lastClr="000000"/>
+        <a:srgbClr val="000000"/>
       </a:dk1>
       <a:lt1>
-        <a:sysClr val="window" lastClr="FFFFFF"/>
+        <a:srgbClr val="FFFFFF"/>
       </a:lt1>
       <a:dk2>
-        <a:srgbClr val="1F497D"/>
+        <a:srgbClr val="46464A"/>
       </a:dk2>
       <a:lt2>
-        <a:srgbClr val="EEECE1"/>
+        <a:srgbClr val="D6D3CC"/>
       </a:lt2>
       <a:accent1>
-        <a:srgbClr val="4F81BD"/>
+        <a:srgbClr val="6F6F74"/>
       </a:accent1>
       <a:accent2>
-        <a:srgbClr val="C0504D"/>
+        <a:srgbClr val="92A9B9"/>
       </a:accent2>
       <a:accent3>
-        <a:srgbClr val="9BBB59"/>
+        <a:srgbClr val="A7B789"/>
       </a:accent3>
       <a:accent4>
-        <a:srgbClr val="8064A2"/>
+        <a:srgbClr val="B9A489"/>
       </a:accent4>
       <a:accent5>
-        <a:srgbClr val="4BACC6"/>
+        <a:srgbClr val="8D6374"/>
       </a:accent5>
       <a:accent6>
-        <a:srgbClr val="F79646"/>
+        <a:srgbClr val="9B7362"/>
       </a:accent6>
       <a:hlink>
-        <a:srgbClr val="0000FF"/>
+        <a:srgbClr val="67AABF"/>
       </a:hlink>
       <a:folHlink>
-        <a:srgbClr val="800080"/>
+        <a:srgbClr val="ABAFA5"/>
       </a:folHlink>
     </a:clrScheme>
-    <a:fontScheme name="Office">
+    <a:fontScheme name="View">
       <a:majorFont>
-        <a:latin typeface="Calibri"/>
+        <a:latin typeface="Century Schoolbook" panose="02040604050505020304"/>
         <a:ea typeface=""/>
         <a:cs typeface=""/>
-        <a:font script="Jpan" typeface="ＭＳ Ｐゴシック"/>
+        <a:font script="Jpan" typeface="ＭＳ ゴシック"/>
         <a:font script="Hang" typeface="맑은 고딕"/>
         <a:font script="Hans" typeface="宋体"/>
         <a:font script="Hant" typeface="新細明體"/>
-        <a:font script="Arab" typeface="Times New Roman"/>
-        <a:font script="Hebr" typeface="Times New Roman"/>
-        <a:font script="Thai" typeface="Angsana New"/>
-        <a:font script="Ethi" typeface="Nyala"/>
-        <a:font script="Beng" typeface="Vrinda"/>
-        <a:font script="Gujr" typeface="Shruti"/>
-        <a:font script="Khmr" typeface="MoolBoran"/>
-        <a:font script="Knda" typeface="Tunga"/>
-        <a:font script="Guru" typeface="Raavi"/>
-        <a:font script="Cans" typeface="Euphemia"/>
-        <a:font script="Cher" typeface="Plantagenet Cherokee"/>
-        <a:font script="Yiii" typeface="Microsoft Yi Baiti"/>
-        <a:font script="Tibt" typeface="Microsoft Himalaya"/>
-        <a:font script="Thaa" typeface="MV Boli"/>
-        <a:font script="Deva" typeface="Mangal"/>
-        <a:font script="Telu" typeface="Gautami"/>
-        <a:font script="Taml" typeface="Latha"/>
-        <a:font script="Syrc" typeface="Estrangelo Edessa"/>
-        <a:font script="Orya" typeface="Kalinga"/>
-        <a:font script="Mlym" typeface="Kartika"/>
-        <a:font script="Laoo" typeface="DokChampa"/>
-        <a:font script="Sinh" typeface="Iskoola Pota"/>
-        <a:font script="Mong" typeface="Mongolian Baiti"/>
-        <a:font script="Viet" typeface="Times New Roman"/>
-        <a:font script="Uigh" typeface="Microsoft Uighur"/>
-        <a:font script="Geor" typeface="Sylfaen"/>
-      </a:majorFont>
-      <a:minorFont>
-        <a:latin typeface="Calibri"/>
-        <a:ea typeface=""/>
-        <a:cs typeface=""/>
-        <a:font script="Jpan" typeface="ＭＳ Ｐゴシック"/>
-        <a:font script="Hang" typeface="맑은 고딕"/>
-        <a:font script="Hans" typeface="宋体"/>
-        <a:font script="Hant" typeface="新細明體"/>
-        <a:font script="Arab" typeface="Arial"/>
-        <a:font script="Hebr" typeface="Arial"/>
-        <a:font script="Thai" typeface="Cordia New"/>
+        <a:font script="Arab" typeface="Tahoma"/>
+        <a:font script="Hebr" typeface="Gisha"/>
+        <a:font script="Thai" typeface="DilleniaUPC"/>
         <a:font script="Ethi" typeface="Nyala"/>
         <a:font script="Beng" typeface="Vrinda"/>
         <a:font script="Gujr" typeface="Shruti"/>
@@ -3327,106 +3648,97 @@
         <a:font script="Laoo" typeface="DokChampa"/>
         <a:font script="Sinh" typeface="Iskoola Pota"/>
         <a:font script="Mong" typeface="Mongolian Baiti"/>
-        <a:font script="Viet" typeface="Arial"/>
+        <a:font script="Viet" typeface="Tahoma"/>
+        <a:font script="Uigh" typeface="Microsoft Uighur"/>
+        <a:font script="Geor" typeface="Sylfaen"/>
+      </a:majorFont>
+      <a:minorFont>
+        <a:latin typeface="Century Schoolbook" panose="02040604050505020304"/>
+        <a:ea typeface=""/>
+        <a:cs typeface=""/>
+        <a:font script="Jpan" typeface="ＭＳ ゴシック"/>
+        <a:font script="Hang" typeface="맑은 고딕"/>
+        <a:font script="Hans" typeface="宋体"/>
+        <a:font script="Hant" typeface="新細明體"/>
+        <a:font script="Arab" typeface="Tahoma"/>
+        <a:font script="Hebr" typeface="Gisha"/>
+        <a:font script="Thai" typeface="DilleniaUPC"/>
+        <a:font script="Ethi" typeface="Nyala"/>
+        <a:font script="Beng" typeface="Vrinda"/>
+        <a:font script="Gujr" typeface="Shruti"/>
+        <a:font script="Khmr" typeface="DaunPenh"/>
+        <a:font script="Knda" typeface="Tunga"/>
+        <a:font script="Guru" typeface="Raavi"/>
+        <a:font script="Cans" typeface="Euphemia"/>
+        <a:font script="Cher" typeface="Plantagenet Cherokee"/>
+        <a:font script="Yiii" typeface="Microsoft Yi Baiti"/>
+        <a:font script="Tibt" typeface="Microsoft Himalaya"/>
+        <a:font script="Thaa" typeface="MV Boli"/>
+        <a:font script="Deva" typeface="Mangal"/>
+        <a:font script="Telu" typeface="Gautami"/>
+        <a:font script="Taml" typeface="Latha"/>
+        <a:font script="Syrc" typeface="Estrangelo Edessa"/>
+        <a:font script="Orya" typeface="Kalinga"/>
+        <a:font script="Mlym" typeface="Kartika"/>
+        <a:font script="Laoo" typeface="DokChampa"/>
+        <a:font script="Sinh" typeface="Iskoola Pota"/>
+        <a:font script="Mong" typeface="Mongolian Baiti"/>
+        <a:font script="Viet" typeface="Verdana"/>
         <a:font script="Uigh" typeface="Microsoft Uighur"/>
         <a:font script="Geor" typeface="Sylfaen"/>
       </a:minorFont>
     </a:fontScheme>
-    <a:fmtScheme name="Office">
+    <a:fmtScheme name="View">
       <a:fillStyleLst>
         <a:solidFill>
           <a:schemeClr val="phClr"/>
         </a:solidFill>
-        <a:gradFill rotWithShape="1">
-          <a:gsLst>
-            <a:gs pos="0">
-              <a:schemeClr val="phClr">
-                <a:tint val="50000"/>
-                <a:satMod val="300000"/>
-              </a:schemeClr>
-            </a:gs>
-            <a:gs pos="35000">
-              <a:schemeClr val="phClr">
-                <a:tint val="37000"/>
-                <a:satMod val="300000"/>
-              </a:schemeClr>
-            </a:gs>
-            <a:gs pos="100000">
-              <a:schemeClr val="phClr">
-                <a:tint val="15000"/>
-                <a:satMod val="350000"/>
-              </a:schemeClr>
-            </a:gs>
-          </a:gsLst>
-          <a:lin ang="16200000" scaled="1"/>
-        </a:gradFill>
-        <a:gradFill rotWithShape="1">
-          <a:gsLst>
-            <a:gs pos="0">
-              <a:schemeClr val="phClr">
-                <a:tint val="100000"/>
-                <a:shade val="100000"/>
-                <a:satMod val="130000"/>
-              </a:schemeClr>
-            </a:gs>
-            <a:gs pos="100000">
-              <a:schemeClr val="phClr">
-                <a:tint val="50000"/>
-                <a:shade val="100000"/>
-                <a:satMod val="350000"/>
-              </a:schemeClr>
-            </a:gs>
-          </a:gsLst>
-          <a:lin ang="16200000" scaled="0"/>
-        </a:gradFill>
+        <a:solidFill>
+          <a:schemeClr val="phClr">
+            <a:tint val="60000"/>
+            <a:satMod val="120000"/>
+          </a:schemeClr>
+        </a:solidFill>
+        <a:solidFill>
+          <a:schemeClr val="phClr">
+            <a:shade val="75000"/>
+            <a:satMod val="160000"/>
+          </a:schemeClr>
+        </a:solidFill>
       </a:fillStyleLst>
       <a:lnStyleLst>
         <a:ln w="9525" cap="flat" cmpd="sng" algn="ctr">
-          <a:solidFill>
-            <a:schemeClr val="phClr">
-              <a:shade val="95000"/>
-              <a:satMod val="105000"/>
-            </a:schemeClr>
-          </a:solidFill>
-          <a:prstDash val="solid"/>
-        </a:ln>
-        <a:ln w="25400" cap="flat" cmpd="sng" algn="ctr">
           <a:solidFill>
             <a:schemeClr val="phClr"/>
           </a:solidFill>
           <a:prstDash val="solid"/>
         </a:ln>
-        <a:ln w="38100" cap="flat" cmpd="sng" algn="ctr">
+        <a:ln w="13970" cap="flat" cmpd="sng" algn="ctr">
           <a:solidFill>
             <a:schemeClr val="phClr"/>
+          </a:solidFill>
+          <a:prstDash val="solid"/>
+        </a:ln>
+        <a:ln w="17145" cap="flat" cmpd="sng" algn="ctr">
+          <a:solidFill>
+            <a:schemeClr val="phClr">
+              <a:shade val="95000"/>
+              <a:alpha val="95000"/>
+              <a:satMod val="150000"/>
+            </a:schemeClr>
           </a:solidFill>
           <a:prstDash val="solid"/>
         </a:ln>
       </a:lnStyleLst>
       <a:effectStyleLst>
         <a:effectStyle>
-          <a:effectLst>
-            <a:outerShdw blurRad="40000" dist="20000" dir="5400000" rotWithShape="0">
-              <a:srgbClr val="000000">
-                <a:alpha val="38000"/>
-              </a:srgbClr>
-            </a:outerShdw>
-          </a:effectLst>
+          <a:effectLst/>
         </a:effectStyle>
         <a:effectStyle>
           <a:effectLst>
-            <a:outerShdw blurRad="40000" dist="23000" dir="5400000" rotWithShape="0">
+            <a:outerShdw blurRad="50800" dist="15240" dir="5400000" algn="tl" rotWithShape="0">
               <a:srgbClr val="000000">
-                <a:alpha val="35000"/>
-              </a:srgbClr>
-            </a:outerShdw>
-          </a:effectLst>
-        </a:effectStyle>
-        <a:effectStyle>
-          <a:effectLst>
-            <a:outerShdw blurRad="40000" dist="23000" dir="5400000" rotWithShape="0">
-              <a:srgbClr val="000000">
-                <a:alpha val="35000"/>
+                <a:alpha val="75000"/>
               </a:srgbClr>
             </a:outerShdw>
           </a:effectLst>
@@ -3434,12 +3746,40 @@
             <a:camera prst="orthographicFront">
               <a:rot lat="0" lon="0" rev="0"/>
             </a:camera>
-            <a:lightRig rig="threePt" dir="t">
-              <a:rot lat="0" lon="0" rev="1200000"/>
-            </a:lightRig>
+            <a:lightRig rig="brightRoom" dir="tl"/>
           </a:scene3d>
-          <a:sp3d>
-            <a:bevelT w="63500" h="25400"/>
+          <a:sp3d contourW="9525" prstMaterial="flat">
+            <a:bevelT w="0" h="0" prst="coolSlant"/>
+            <a:contourClr>
+              <a:schemeClr val="phClr">
+                <a:shade val="35000"/>
+                <a:satMod val="130000"/>
+              </a:schemeClr>
+            </a:contourClr>
+          </a:sp3d>
+        </a:effectStyle>
+        <a:effectStyle>
+          <a:effectLst>
+            <a:outerShdw blurRad="76200" dist="25400" dir="5400000" algn="tl" rotWithShape="0">
+              <a:srgbClr val="000000">
+                <a:alpha val="55000"/>
+              </a:srgbClr>
+            </a:outerShdw>
+          </a:effectLst>
+          <a:scene3d>
+            <a:camera prst="orthographicFront">
+              <a:rot lat="0" lon="0" rev="0"/>
+            </a:camera>
+            <a:lightRig rig="brightRoom" dir="tl"/>
+          </a:scene3d>
+          <a:sp3d contourW="19050" prstMaterial="flat">
+            <a:bevelT w="0" h="0" prst="coolSlant"/>
+            <a:contourClr>
+              <a:schemeClr val="phClr">
+                <a:shade val="25000"/>
+                <a:satMod val="140000"/>
+              </a:schemeClr>
+            </a:contourClr>
           </a:sp3d>
         </a:effectStyle>
       </a:effectStyleLst>
@@ -3447,95 +3787,44 @@
         <a:solidFill>
           <a:schemeClr val="phClr"/>
         </a:solidFill>
+        <a:solidFill>
+          <a:schemeClr val="phClr">
+            <a:tint val="95000"/>
+            <a:satMod val="170000"/>
+          </a:schemeClr>
+        </a:solidFill>
         <a:gradFill rotWithShape="1">
           <a:gsLst>
             <a:gs pos="0">
               <a:schemeClr val="phClr">
-                <a:tint val="40000"/>
-                <a:satMod val="350000"/>
-              </a:schemeClr>
-            </a:gs>
-            <a:gs pos="40000">
-              <a:schemeClr val="phClr">
-                <a:tint val="45000"/>
-                <a:shade val="99000"/>
-                <a:satMod val="350000"/>
+                <a:tint val="94000"/>
+                <a:shade val="98000"/>
+                <a:satMod val="130000"/>
+                <a:lumMod val="102000"/>
               </a:schemeClr>
             </a:gs>
             <a:gs pos="100000">
               <a:schemeClr val="phClr">
-                <a:shade val="20000"/>
-                <a:satMod val="255000"/>
+                <a:tint val="98000"/>
+                <a:shade val="78000"/>
+                <a:satMod val="140000"/>
               </a:schemeClr>
             </a:gs>
           </a:gsLst>
           <a:path path="circle">
-            <a:fillToRect l="50000" t="-80000" r="50000" b="180000"/>
-          </a:path>
-        </a:gradFill>
-        <a:gradFill rotWithShape="1">
-          <a:gsLst>
-            <a:gs pos="0">
-              <a:schemeClr val="phClr">
-                <a:tint val="80000"/>
-                <a:satMod val="300000"/>
-              </a:schemeClr>
-            </a:gs>
-            <a:gs pos="100000">
-              <a:schemeClr val="phClr">
-                <a:shade val="30000"/>
-                <a:satMod val="200000"/>
-              </a:schemeClr>
-            </a:gs>
-          </a:gsLst>
-          <a:path path="circle">
-            <a:fillToRect l="50000" t="50000" r="50000" b="50000"/>
+            <a:fillToRect l="100000" t="100000" r="100000" b="100000"/>
           </a:path>
         </a:gradFill>
       </a:bgFillStyleLst>
     </a:fmtScheme>
   </a:themeElements>
-  <a:objectDefaults>
-    <a:spDef>
-      <a:spPr/>
-      <a:bodyPr/>
-      <a:lstStyle/>
-      <a:style>
-        <a:lnRef idx="1">
-          <a:schemeClr val="accent1"/>
-        </a:lnRef>
-        <a:fillRef idx="3">
-          <a:schemeClr val="accent1"/>
-        </a:fillRef>
-        <a:effectRef idx="2">
-          <a:schemeClr val="accent1"/>
-        </a:effectRef>
-        <a:fontRef idx="minor">
-          <a:schemeClr val="lt1"/>
-        </a:fontRef>
-      </a:style>
-    </a:spDef>
-    <a:lnDef>
-      <a:spPr/>
-      <a:bodyPr/>
-      <a:lstStyle/>
-      <a:style>
-        <a:lnRef idx="2">
-          <a:schemeClr val="accent1"/>
-        </a:lnRef>
-        <a:fillRef idx="0">
-          <a:schemeClr val="accent1"/>
-        </a:fillRef>
-        <a:effectRef idx="1">
-          <a:schemeClr val="accent1"/>
-        </a:effectRef>
-        <a:fontRef idx="minor">
-          <a:schemeClr val="tx1"/>
-        </a:fontRef>
-      </a:style>
-    </a:lnDef>
-  </a:objectDefaults>
+  <a:objectDefaults/>
   <a:extraClrSchemeLst/>
+  <a:extLst>
+    <a:ext uri="{05A4C25C-085E-4340-85A3-A5531E510DB2}">
+      <thm15:themeFamily xmlns:thm15="http://schemas.microsoft.com/office/thememl/2012/main" name="View" id="{BA0EB5A6-F2D4-4F82-977B-64ADEE4A2A69}" vid="{3969A8A2-35DB-4E3B-8885-16FD20568674}"/>
+    </a:ext>
+  </a:extLst>
 </a:theme>
 </file>
 

</xml_diff>